<commit_message>
v,0.7.4: refer devel history
</commit_message>
<xml_diff>
--- a/doc/screens.pptx
+++ b/doc/screens.pptx
@@ -5,14 +5,15 @@
     <p:sldMasterId id="2147483648" r:id="rId1"/>
   </p:sldMasterIdLst>
   <p:notesMasterIdLst>
-    <p:notesMasterId r:id="rId7"/>
+    <p:notesMasterId r:id="rId8"/>
   </p:notesMasterIdLst>
   <p:sldIdLst>
     <p:sldId id="256" r:id="rId2"/>
-    <p:sldId id="257" r:id="rId3"/>
-    <p:sldId id="258" r:id="rId4"/>
-    <p:sldId id="259" r:id="rId5"/>
-    <p:sldId id="260" r:id="rId6"/>
+    <p:sldId id="261" r:id="rId3"/>
+    <p:sldId id="257" r:id="rId4"/>
+    <p:sldId id="258" r:id="rId5"/>
+    <p:sldId id="259" r:id="rId6"/>
+    <p:sldId id="260" r:id="rId7"/>
   </p:sldIdLst>
   <p:sldSz cx="12192000" cy="6858000"/>
   <p:notesSz cx="6858000" cy="9144000"/>
@@ -201,7 +202,7 @@
           <a:p>
             <a:fld id="{647E52AF-4AA1-4B1D-B9DC-FCD89EA23B91}" type="datetimeFigureOut">
               <a:rPr lang="ko-KR" altLang="en-US" smtClean="0"/>
-              <a:t>2025-08-29</a:t>
+              <a:t>2025-09-04</a:t>
             </a:fld>
             <a:endParaRPr lang="ko-KR" altLang="en-US"/>
           </a:p>
@@ -615,7 +616,7 @@
           <a:p>
             <a:fld id="{D88AF149-FA8E-4E37-97A2-F573235A52AD}" type="datetimeFigureOut">
               <a:rPr lang="ko-KR" altLang="en-US" smtClean="0"/>
-              <a:t>2025-08-29</a:t>
+              <a:t>2025-09-04</a:t>
             </a:fld>
             <a:endParaRPr lang="ko-KR" altLang="en-US"/>
           </a:p>
@@ -813,7 +814,7 @@
           <a:p>
             <a:fld id="{D88AF149-FA8E-4E37-97A2-F573235A52AD}" type="datetimeFigureOut">
               <a:rPr lang="ko-KR" altLang="en-US" smtClean="0"/>
-              <a:t>2025-08-29</a:t>
+              <a:t>2025-09-04</a:t>
             </a:fld>
             <a:endParaRPr lang="ko-KR" altLang="en-US"/>
           </a:p>
@@ -1021,7 +1022,7 @@
           <a:p>
             <a:fld id="{D88AF149-FA8E-4E37-97A2-F573235A52AD}" type="datetimeFigureOut">
               <a:rPr lang="ko-KR" altLang="en-US" smtClean="0"/>
-              <a:t>2025-08-29</a:t>
+              <a:t>2025-09-04</a:t>
             </a:fld>
             <a:endParaRPr lang="ko-KR" altLang="en-US"/>
           </a:p>
@@ -1219,7 +1220,7 @@
           <a:p>
             <a:fld id="{D88AF149-FA8E-4E37-97A2-F573235A52AD}" type="datetimeFigureOut">
               <a:rPr lang="ko-KR" altLang="en-US" smtClean="0"/>
-              <a:t>2025-08-29</a:t>
+              <a:t>2025-09-04</a:t>
             </a:fld>
             <a:endParaRPr lang="ko-KR" altLang="en-US"/>
           </a:p>
@@ -1494,7 +1495,7 @@
           <a:p>
             <a:fld id="{D88AF149-FA8E-4E37-97A2-F573235A52AD}" type="datetimeFigureOut">
               <a:rPr lang="ko-KR" altLang="en-US" smtClean="0"/>
-              <a:t>2025-08-29</a:t>
+              <a:t>2025-09-04</a:t>
             </a:fld>
             <a:endParaRPr lang="ko-KR" altLang="en-US"/>
           </a:p>
@@ -1759,7 +1760,7 @@
           <a:p>
             <a:fld id="{D88AF149-FA8E-4E37-97A2-F573235A52AD}" type="datetimeFigureOut">
               <a:rPr lang="ko-KR" altLang="en-US" smtClean="0"/>
-              <a:t>2025-08-29</a:t>
+              <a:t>2025-09-04</a:t>
             </a:fld>
             <a:endParaRPr lang="ko-KR" altLang="en-US"/>
           </a:p>
@@ -2171,7 +2172,7 @@
           <a:p>
             <a:fld id="{D88AF149-FA8E-4E37-97A2-F573235A52AD}" type="datetimeFigureOut">
               <a:rPr lang="ko-KR" altLang="en-US" smtClean="0"/>
-              <a:t>2025-08-29</a:t>
+              <a:t>2025-09-04</a:t>
             </a:fld>
             <a:endParaRPr lang="ko-KR" altLang="en-US"/>
           </a:p>
@@ -2312,7 +2313,7 @@
           <a:p>
             <a:fld id="{D88AF149-FA8E-4E37-97A2-F573235A52AD}" type="datetimeFigureOut">
               <a:rPr lang="ko-KR" altLang="en-US" smtClean="0"/>
-              <a:t>2025-08-29</a:t>
+              <a:t>2025-09-04</a:t>
             </a:fld>
             <a:endParaRPr lang="ko-KR" altLang="en-US"/>
           </a:p>
@@ -2425,7 +2426,7 @@
           <a:p>
             <a:fld id="{D88AF149-FA8E-4E37-97A2-F573235A52AD}" type="datetimeFigureOut">
               <a:rPr lang="ko-KR" altLang="en-US" smtClean="0"/>
-              <a:t>2025-08-29</a:t>
+              <a:t>2025-09-04</a:t>
             </a:fld>
             <a:endParaRPr lang="ko-KR" altLang="en-US"/>
           </a:p>
@@ -2736,7 +2737,7 @@
           <a:p>
             <a:fld id="{D88AF149-FA8E-4E37-97A2-F573235A52AD}" type="datetimeFigureOut">
               <a:rPr lang="ko-KR" altLang="en-US" smtClean="0"/>
-              <a:t>2025-08-29</a:t>
+              <a:t>2025-09-04</a:t>
             </a:fld>
             <a:endParaRPr lang="ko-KR" altLang="en-US"/>
           </a:p>
@@ -3024,7 +3025,7 @@
           <a:p>
             <a:fld id="{D88AF149-FA8E-4E37-97A2-F573235A52AD}" type="datetimeFigureOut">
               <a:rPr lang="ko-KR" altLang="en-US" smtClean="0"/>
-              <a:t>2025-08-29</a:t>
+              <a:t>2025-09-04</a:t>
             </a:fld>
             <a:endParaRPr lang="ko-KR" altLang="en-US"/>
           </a:p>
@@ -3265,7 +3266,7 @@
           <a:p>
             <a:fld id="{D88AF149-FA8E-4E37-97A2-F573235A52AD}" type="datetimeFigureOut">
               <a:rPr lang="ko-KR" altLang="en-US" smtClean="0"/>
-              <a:t>2025-08-29</a:t>
+              <a:t>2025-09-04</a:t>
             </a:fld>
             <a:endParaRPr lang="ko-KR" altLang="en-US"/>
           </a:p>
@@ -4312,7 +4313,7 @@
           <p:cNvPr id="3" name="그림 2">
             <a:extLst>
               <a:ext uri="{FF2B5EF4-FFF2-40B4-BE49-F238E27FC236}">
-                <a16:creationId xmlns:a16="http://schemas.microsoft.com/office/drawing/2014/main" id="{AA656A62-5527-9B46-061F-89FD89A26BCC}"/>
+                <a16:creationId xmlns:a16="http://schemas.microsoft.com/office/drawing/2014/main" id="{68A5857D-960F-E9BB-AB8B-530738B724E5}"/>
               </a:ext>
             </a:extLst>
           </p:cNvPr>
@@ -4329,8 +4330,8 @@
         </p:blipFill>
         <p:spPr>
           <a:xfrm>
-            <a:off x="2637401" y="1151644"/>
-            <a:ext cx="7093162" cy="5268047"/>
+            <a:off x="1643913" y="1832515"/>
+            <a:ext cx="9343753" cy="2657454"/>
           </a:xfrm>
           <a:prstGeom prst="rect">
             <a:avLst/>
@@ -4339,45 +4340,10 @@
       </p:pic>
       <p:sp>
         <p:nvSpPr>
-          <p:cNvPr id="4" name="TextBox 3">
-            <a:extLst>
-              <a:ext uri="{FF2B5EF4-FFF2-40B4-BE49-F238E27FC236}">
-                <a16:creationId xmlns:a16="http://schemas.microsoft.com/office/drawing/2014/main" id="{47148512-BEC1-D406-5FBC-6ED2C2EBA59C}"/>
-              </a:ext>
-            </a:extLst>
-          </p:cNvPr>
-          <p:cNvSpPr txBox="1"/>
-          <p:nvPr/>
-        </p:nvSpPr>
-        <p:spPr>
-          <a:xfrm>
-            <a:off x="143584" y="253643"/>
-            <a:ext cx="2887329" cy="369332"/>
-          </a:xfrm>
-          <a:prstGeom prst="rect">
-            <a:avLst/>
-          </a:prstGeom>
-          <a:noFill/>
-        </p:spPr>
-        <p:txBody>
-          <a:bodyPr wrap="none" rtlCol="0">
-            <a:spAutoFit/>
-          </a:bodyPr>
-          <a:lstStyle/>
-          <a:p>
-            <a:r>
-              <a:rPr lang="ko-KR" altLang="en-US"/>
-              <a:t>데이터타입 들여오기 화면</a:t>
-            </a:r>
-          </a:p>
-        </p:txBody>
-      </p:sp>
-      <p:sp>
-        <p:nvSpPr>
-          <p:cNvPr id="5" name="직사각형 4">
-            <a:extLst>
-              <a:ext uri="{FF2B5EF4-FFF2-40B4-BE49-F238E27FC236}">
-                <a16:creationId xmlns:a16="http://schemas.microsoft.com/office/drawing/2014/main" id="{B3A8BEBE-C817-C94D-A93B-608000E2B6AD}"/>
+          <p:cNvPr id="4" name="직사각형 3">
+            <a:extLst>
+              <a:ext uri="{FF2B5EF4-FFF2-40B4-BE49-F238E27FC236}">
+                <a16:creationId xmlns:a16="http://schemas.microsoft.com/office/drawing/2014/main" id="{CDF8B146-B2C5-A273-B9BF-FFDD647647B1}"/>
               </a:ext>
             </a:extLst>
           </p:cNvPr>
@@ -4386,8 +4352,8 @@
         </p:nvSpPr>
         <p:spPr>
           <a:xfrm>
-            <a:off x="4776431" y="1151644"/>
-            <a:ext cx="1518571" cy="374830"/>
+            <a:off x="4259766" y="1843667"/>
+            <a:ext cx="1895707" cy="327104"/>
           </a:xfrm>
           <a:prstGeom prst="rect">
             <a:avLst/>
@@ -4401,61 +4367,6 @@
         </p:spPr>
         <p:style>
           <a:lnRef idx="2">
-            <a:schemeClr val="accent1">
-              <a:shade val="15000"/>
-            </a:schemeClr>
-          </a:lnRef>
-          <a:fillRef idx="1">
-            <a:schemeClr val="accent1"/>
-          </a:fillRef>
-          <a:effectRef idx="0">
-            <a:schemeClr val="accent1"/>
-          </a:effectRef>
-          <a:fontRef idx="minor">
-            <a:schemeClr val="lt1"/>
-          </a:fontRef>
-        </p:style>
-        <p:txBody>
-          <a:bodyPr rtlCol="0" anchor="ctr"/>
-          <a:lstStyle/>
-          <a:p>
-            <a:pPr algn="ctr"/>
-            <a:endParaRPr lang="ko-KR" altLang="en-US" dirty="0"/>
-          </a:p>
-        </p:txBody>
-      </p:sp>
-      <p:sp>
-        <p:nvSpPr>
-          <p:cNvPr id="6" name="설명선: 굽은 이중선 5">
-            <a:extLst>
-              <a:ext uri="{FF2B5EF4-FFF2-40B4-BE49-F238E27FC236}">
-                <a16:creationId xmlns:a16="http://schemas.microsoft.com/office/drawing/2014/main" id="{AD67BFFE-1A36-B062-3BA7-03C582CA96B9}"/>
-              </a:ext>
-            </a:extLst>
-          </p:cNvPr>
-          <p:cNvSpPr/>
-          <p:nvPr/>
-        </p:nvSpPr>
-        <p:spPr>
-          <a:xfrm>
-            <a:off x="4857958" y="609464"/>
-            <a:ext cx="1349554" cy="313050"/>
-          </a:xfrm>
-          <a:prstGeom prst="borderCallout3">
-            <a:avLst>
-              <a:gd name="adj1" fmla="val 18750"/>
-              <a:gd name="adj2" fmla="val -8333"/>
-              <a:gd name="adj3" fmla="val 18750"/>
-              <a:gd name="adj4" fmla="val -16667"/>
-              <a:gd name="adj5" fmla="val 100000"/>
-              <a:gd name="adj6" fmla="val -16667"/>
-              <a:gd name="adj7" fmla="val 175276"/>
-              <a:gd name="adj8" fmla="val -3178"/>
-            </a:avLst>
-          </a:prstGeom>
-        </p:spPr>
-        <p:style>
-          <a:lnRef idx="2">
             <a:schemeClr val="accent1"/>
           </a:lnRef>
           <a:fillRef idx="1">
@@ -4473,23 +4384,16 @@
           <a:lstStyle/>
           <a:p>
             <a:pPr algn="ctr"/>
-            <a:r>
-              <a:rPr lang="en-US" altLang="ko-KR" sz="1000" dirty="0"/>
-              <a:t>CRF </a:t>
-            </a:r>
-            <a:r>
-              <a:rPr lang="ko-KR" altLang="en-US" sz="1000" dirty="0"/>
-              <a:t>들여오기 섹션</a:t>
-            </a:r>
-          </a:p>
-        </p:txBody>
-      </p:sp>
-      <p:sp>
-        <p:nvSpPr>
-          <p:cNvPr id="7" name="직사각형 6">
-            <a:extLst>
-              <a:ext uri="{FF2B5EF4-FFF2-40B4-BE49-F238E27FC236}">
-                <a16:creationId xmlns:a16="http://schemas.microsoft.com/office/drawing/2014/main" id="{BEEBEF4C-9208-159E-A20F-21417C4DA9B8}"/>
+            <a:endParaRPr lang="ko-KR" altLang="en-US" sz="1000" dirty="0"/>
+          </a:p>
+        </p:txBody>
+      </p:sp>
+      <p:sp>
+        <p:nvSpPr>
+          <p:cNvPr id="5" name="직사각형 4">
+            <a:extLst>
+              <a:ext uri="{FF2B5EF4-FFF2-40B4-BE49-F238E27FC236}">
+                <a16:creationId xmlns:a16="http://schemas.microsoft.com/office/drawing/2014/main" id="{B429ACD9-36E2-DFE0-06B4-03260F61D21D}"/>
               </a:ext>
             </a:extLst>
           </p:cNvPr>
@@ -4498,8 +4402,8 @@
         </p:nvSpPr>
         <p:spPr>
           <a:xfrm>
-            <a:off x="6285507" y="1151644"/>
-            <a:ext cx="2594711" cy="374830"/>
+            <a:off x="6315790" y="1832515"/>
+            <a:ext cx="2455535" cy="327104"/>
           </a:xfrm>
           <a:prstGeom prst="rect">
             <a:avLst/>
@@ -4513,61 +4417,6 @@
         </p:spPr>
         <p:style>
           <a:lnRef idx="2">
-            <a:schemeClr val="accent1">
-              <a:shade val="15000"/>
-            </a:schemeClr>
-          </a:lnRef>
-          <a:fillRef idx="1">
-            <a:schemeClr val="accent1"/>
-          </a:fillRef>
-          <a:effectRef idx="0">
-            <a:schemeClr val="accent1"/>
-          </a:effectRef>
-          <a:fontRef idx="minor">
-            <a:schemeClr val="lt1"/>
-          </a:fontRef>
-        </p:style>
-        <p:txBody>
-          <a:bodyPr rtlCol="0" anchor="ctr"/>
-          <a:lstStyle/>
-          <a:p>
-            <a:pPr algn="ctr"/>
-            <a:endParaRPr lang="ko-KR" altLang="en-US" dirty="0"/>
-          </a:p>
-        </p:txBody>
-      </p:sp>
-      <p:sp>
-        <p:nvSpPr>
-          <p:cNvPr id="8" name="설명선: 굽은 이중선 7">
-            <a:extLst>
-              <a:ext uri="{FF2B5EF4-FFF2-40B4-BE49-F238E27FC236}">
-                <a16:creationId xmlns:a16="http://schemas.microsoft.com/office/drawing/2014/main" id="{0722593F-EB3F-B477-B639-5FBB5357F0E0}"/>
-              </a:ext>
-            </a:extLst>
-          </p:cNvPr>
-          <p:cNvSpPr/>
-          <p:nvPr/>
-        </p:nvSpPr>
-        <p:spPr>
-          <a:xfrm>
-            <a:off x="6732517" y="631089"/>
-            <a:ext cx="850345" cy="313050"/>
-          </a:xfrm>
-          <a:prstGeom prst="borderCallout3">
-            <a:avLst>
-              <a:gd name="adj1" fmla="val 18750"/>
-              <a:gd name="adj2" fmla="val -8333"/>
-              <a:gd name="adj3" fmla="val 18750"/>
-              <a:gd name="adj4" fmla="val -16667"/>
-              <a:gd name="adj5" fmla="val 102282"/>
-              <a:gd name="adj6" fmla="val -22548"/>
-              <a:gd name="adj7" fmla="val 157020"/>
-              <a:gd name="adj8" fmla="val -4018"/>
-            </a:avLst>
-          </a:prstGeom>
-        </p:spPr>
-        <p:style>
-          <a:lnRef idx="2">
             <a:schemeClr val="accent1"/>
           </a:lnRef>
           <a:fillRef idx="1">
@@ -4585,23 +4434,16 @@
           <a:lstStyle/>
           <a:p>
             <a:pPr algn="ctr"/>
-            <a:r>
-              <a:rPr lang="ko-KR" altLang="en-US" sz="1000"/>
-              <a:t>버튼 </a:t>
-            </a:r>
-            <a:r>
-              <a:rPr lang="ko-KR" altLang="en-US" sz="1000" dirty="0"/>
-              <a:t>섹션</a:t>
-            </a:r>
-          </a:p>
-        </p:txBody>
-      </p:sp>
-      <p:sp>
-        <p:nvSpPr>
-          <p:cNvPr id="9" name="직사각형 8">
-            <a:extLst>
-              <a:ext uri="{FF2B5EF4-FFF2-40B4-BE49-F238E27FC236}">
-                <a16:creationId xmlns:a16="http://schemas.microsoft.com/office/drawing/2014/main" id="{3FD39C2C-F898-1505-359A-86CAA36C123B}"/>
+            <a:endParaRPr lang="ko-KR" altLang="en-US" sz="1000" dirty="0"/>
+          </a:p>
+        </p:txBody>
+      </p:sp>
+      <p:sp>
+        <p:nvSpPr>
+          <p:cNvPr id="6" name="직사각형 5">
+            <a:extLst>
+              <a:ext uri="{FF2B5EF4-FFF2-40B4-BE49-F238E27FC236}">
+                <a16:creationId xmlns:a16="http://schemas.microsoft.com/office/drawing/2014/main" id="{D3AA798E-44B5-9F42-5F06-6C6F384AADA1}"/>
               </a:ext>
             </a:extLst>
           </p:cNvPr>
@@ -4610,8 +4452,8 @@
         </p:nvSpPr>
         <p:spPr>
           <a:xfrm>
-            <a:off x="8949671" y="1164336"/>
-            <a:ext cx="612119" cy="362138"/>
+            <a:off x="8845631" y="1832515"/>
+            <a:ext cx="2142036" cy="327104"/>
           </a:xfrm>
           <a:prstGeom prst="rect">
             <a:avLst/>
@@ -4625,61 +4467,6 @@
         </p:spPr>
         <p:style>
           <a:lnRef idx="2">
-            <a:schemeClr val="accent1">
-              <a:shade val="15000"/>
-            </a:schemeClr>
-          </a:lnRef>
-          <a:fillRef idx="1">
-            <a:schemeClr val="accent1"/>
-          </a:fillRef>
-          <a:effectRef idx="0">
-            <a:schemeClr val="accent1"/>
-          </a:effectRef>
-          <a:fontRef idx="minor">
-            <a:schemeClr val="lt1"/>
-          </a:fontRef>
-        </p:style>
-        <p:txBody>
-          <a:bodyPr rtlCol="0" anchor="ctr"/>
-          <a:lstStyle/>
-          <a:p>
-            <a:pPr algn="ctr"/>
-            <a:endParaRPr lang="ko-KR" altLang="en-US" dirty="0"/>
-          </a:p>
-        </p:txBody>
-      </p:sp>
-      <p:sp>
-        <p:nvSpPr>
-          <p:cNvPr id="10" name="설명선: 굽은 이중선 9">
-            <a:extLst>
-              <a:ext uri="{FF2B5EF4-FFF2-40B4-BE49-F238E27FC236}">
-                <a16:creationId xmlns:a16="http://schemas.microsoft.com/office/drawing/2014/main" id="{CFD371B4-CB98-896F-76C1-B99018277526}"/>
-              </a:ext>
-            </a:extLst>
-          </p:cNvPr>
-          <p:cNvSpPr/>
-          <p:nvPr/>
-        </p:nvSpPr>
-        <p:spPr>
-          <a:xfrm>
-            <a:off x="8477536" y="578317"/>
-            <a:ext cx="1153596" cy="313050"/>
-          </a:xfrm>
-          <a:prstGeom prst="borderCallout3">
-            <a:avLst>
-              <a:gd name="adj1" fmla="val 97569"/>
-              <a:gd name="adj2" fmla="val 42623"/>
-              <a:gd name="adj3" fmla="val 125388"/>
-              <a:gd name="adj4" fmla="val 47501"/>
-              <a:gd name="adj5" fmla="val 148646"/>
-              <a:gd name="adj6" fmla="val 57975"/>
-              <a:gd name="adj7" fmla="val 183178"/>
-              <a:gd name="adj8" fmla="val 64116"/>
-            </a:avLst>
-          </a:prstGeom>
-        </p:spPr>
-        <p:style>
-          <a:lnRef idx="2">
             <a:schemeClr val="accent1"/>
           </a:lnRef>
           <a:fillRef idx="1">
@@ -4697,23 +4484,16 @@
           <a:lstStyle/>
           <a:p>
             <a:pPr algn="ctr"/>
-            <a:r>
-              <a:rPr lang="ko-KR" altLang="en-US" sz="1000"/>
-              <a:t>리다이렉트</a:t>
-            </a:r>
-            <a:r>
-              <a:rPr lang="ko-KR" altLang="en-US" sz="1000" dirty="0"/>
-              <a:t> 섹션</a:t>
-            </a:r>
-          </a:p>
-        </p:txBody>
-      </p:sp>
-      <p:sp>
-        <p:nvSpPr>
-          <p:cNvPr id="11" name="직사각형 10">
-            <a:extLst>
-              <a:ext uri="{FF2B5EF4-FFF2-40B4-BE49-F238E27FC236}">
-                <a16:creationId xmlns:a16="http://schemas.microsoft.com/office/drawing/2014/main" id="{57EC87C8-3CDF-792D-D14C-67492BB9EA2A}"/>
+            <a:endParaRPr lang="ko-KR" altLang="en-US" sz="1000" dirty="0"/>
+          </a:p>
+        </p:txBody>
+      </p:sp>
+      <p:sp>
+        <p:nvSpPr>
+          <p:cNvPr id="7" name="직사각형 6">
+            <a:extLst>
+              <a:ext uri="{FF2B5EF4-FFF2-40B4-BE49-F238E27FC236}">
+                <a16:creationId xmlns:a16="http://schemas.microsoft.com/office/drawing/2014/main" id="{7A720B7B-5437-6225-F727-5F7AC9640910}"/>
               </a:ext>
             </a:extLst>
           </p:cNvPr>
@@ -4722,8 +4502,8 @@
         </p:nvSpPr>
         <p:spPr>
           <a:xfrm>
-            <a:off x="2637401" y="1573281"/>
-            <a:ext cx="6993731" cy="3550381"/>
+            <a:off x="1643912" y="2343538"/>
+            <a:ext cx="4671878" cy="1173853"/>
           </a:xfrm>
           <a:prstGeom prst="rect">
             <a:avLst/>
@@ -4737,18 +4517,16 @@
         </p:spPr>
         <p:style>
           <a:lnRef idx="2">
-            <a:schemeClr val="accent1">
-              <a:shade val="15000"/>
-            </a:schemeClr>
+            <a:schemeClr val="accent1"/>
           </a:lnRef>
           <a:fillRef idx="1">
-            <a:schemeClr val="accent1"/>
+            <a:schemeClr val="lt1"/>
           </a:fillRef>
           <a:effectRef idx="0">
             <a:schemeClr val="accent1"/>
           </a:effectRef>
           <a:fontRef idx="minor">
-            <a:schemeClr val="lt1"/>
+            <a:schemeClr val="dk1"/>
           </a:fontRef>
         </p:style>
         <p:txBody>
@@ -4756,63 +4534,16 @@
           <a:lstStyle/>
           <a:p>
             <a:pPr algn="ctr"/>
-            <a:endParaRPr lang="ko-KR" altLang="en-US" dirty="0"/>
-          </a:p>
-        </p:txBody>
-      </p:sp>
-      <p:sp>
-        <p:nvSpPr>
-          <p:cNvPr id="12" name="TextBox 11">
-            <a:extLst>
-              <a:ext uri="{FF2B5EF4-FFF2-40B4-BE49-F238E27FC236}">
-                <a16:creationId xmlns:a16="http://schemas.microsoft.com/office/drawing/2014/main" id="{E2612C44-54A0-5E12-7855-01673C1F9851}"/>
-              </a:ext>
-            </a:extLst>
-          </p:cNvPr>
-          <p:cNvSpPr txBox="1"/>
-          <p:nvPr/>
-        </p:nvSpPr>
-        <p:spPr>
-          <a:xfrm>
-            <a:off x="5204077" y="2692148"/>
-            <a:ext cx="816249" cy="276999"/>
-          </a:xfrm>
-          <a:prstGeom prst="rect">
-            <a:avLst/>
-          </a:prstGeom>
-          <a:noFill/>
-        </p:spPr>
-        <p:txBody>
-          <a:bodyPr wrap="none" rtlCol="0">
-            <a:spAutoFit/>
-          </a:bodyPr>
-          <a:lstStyle/>
-          <a:p>
-            <a:r>
-              <a:rPr lang="en-US" altLang="ko-KR" sz="1200" dirty="0">
-                <a:solidFill>
-                  <a:srgbClr val="C00000"/>
-                </a:solidFill>
-              </a:rPr>
-              <a:t>CRF </a:t>
-            </a:r>
-            <a:r>
-              <a:rPr lang="ko-KR" altLang="en-US" sz="1200" dirty="0">
-                <a:solidFill>
-                  <a:srgbClr val="C00000"/>
-                </a:solidFill>
-              </a:rPr>
-              <a:t>정보</a:t>
-            </a:r>
-          </a:p>
-        </p:txBody>
-      </p:sp>
-      <p:sp>
-        <p:nvSpPr>
-          <p:cNvPr id="13" name="직사각형 12">
-            <a:extLst>
-              <a:ext uri="{FF2B5EF4-FFF2-40B4-BE49-F238E27FC236}">
-                <a16:creationId xmlns:a16="http://schemas.microsoft.com/office/drawing/2014/main" id="{1FF3126D-026E-5B9C-BCC9-A1A48C651BB9}"/>
+            <a:endParaRPr lang="ko-KR" altLang="en-US" sz="1000" dirty="0"/>
+          </a:p>
+        </p:txBody>
+      </p:sp>
+      <p:sp>
+        <p:nvSpPr>
+          <p:cNvPr id="8" name="직사각형 7">
+            <a:extLst>
+              <a:ext uri="{FF2B5EF4-FFF2-40B4-BE49-F238E27FC236}">
+                <a16:creationId xmlns:a16="http://schemas.microsoft.com/office/drawing/2014/main" id="{6941DA2F-2B0B-4FB0-5F10-B2CBDB2A63D6}"/>
               </a:ext>
             </a:extLst>
           </p:cNvPr>
@@ -4821,8 +4552,8 @@
         </p:nvSpPr>
         <p:spPr>
           <a:xfrm>
-            <a:off x="5352586" y="5360021"/>
-            <a:ext cx="1501697" cy="346336"/>
+            <a:off x="6435386" y="2337441"/>
+            <a:ext cx="4552280" cy="1173853"/>
           </a:xfrm>
           <a:prstGeom prst="rect">
             <a:avLst/>
@@ -4836,18 +4567,16 @@
         </p:spPr>
         <p:style>
           <a:lnRef idx="2">
-            <a:schemeClr val="accent1">
-              <a:shade val="15000"/>
-            </a:schemeClr>
+            <a:schemeClr val="accent1"/>
           </a:lnRef>
           <a:fillRef idx="1">
-            <a:schemeClr val="accent1"/>
+            <a:schemeClr val="lt1"/>
           </a:fillRef>
           <a:effectRef idx="0">
             <a:schemeClr val="accent1"/>
           </a:effectRef>
           <a:fontRef idx="minor">
-            <a:schemeClr val="lt1"/>
+            <a:schemeClr val="dk1"/>
           </a:fontRef>
         </p:style>
         <p:txBody>
@@ -4855,16 +4584,16 @@
           <a:lstStyle/>
           <a:p>
             <a:pPr algn="ctr"/>
-            <a:endParaRPr lang="ko-KR" altLang="en-US" dirty="0"/>
-          </a:p>
-        </p:txBody>
-      </p:sp>
-      <p:sp>
-        <p:nvSpPr>
-          <p:cNvPr id="14" name="직사각형 13">
-            <a:extLst>
-              <a:ext uri="{FF2B5EF4-FFF2-40B4-BE49-F238E27FC236}">
-                <a16:creationId xmlns:a16="http://schemas.microsoft.com/office/drawing/2014/main" id="{A04AF2D7-37E6-635C-34AC-2324F2BF2C4D}"/>
+            <a:endParaRPr lang="ko-KR" altLang="en-US" sz="1000" dirty="0"/>
+          </a:p>
+        </p:txBody>
+      </p:sp>
+      <p:sp>
+        <p:nvSpPr>
+          <p:cNvPr id="9" name="직사각형 8">
+            <a:extLst>
+              <a:ext uri="{FF2B5EF4-FFF2-40B4-BE49-F238E27FC236}">
+                <a16:creationId xmlns:a16="http://schemas.microsoft.com/office/drawing/2014/main" id="{8E5469DE-3E94-4CFD-1CBE-62984B4BEA26}"/>
               </a:ext>
             </a:extLst>
           </p:cNvPr>
@@ -4873,8 +4602,8 @@
         </p:nvSpPr>
         <p:spPr>
           <a:xfrm>
-            <a:off x="6854283" y="5352792"/>
-            <a:ext cx="2776849" cy="346336"/>
+            <a:off x="1643912" y="3611505"/>
+            <a:ext cx="9343752" cy="826383"/>
           </a:xfrm>
           <a:prstGeom prst="rect">
             <a:avLst/>
@@ -4888,113 +4617,6 @@
         </p:spPr>
         <p:style>
           <a:lnRef idx="2">
-            <a:schemeClr val="accent1">
-              <a:shade val="15000"/>
-            </a:schemeClr>
-          </a:lnRef>
-          <a:fillRef idx="1">
-            <a:schemeClr val="accent1"/>
-          </a:fillRef>
-          <a:effectRef idx="0">
-            <a:schemeClr val="accent1"/>
-          </a:effectRef>
-          <a:fontRef idx="minor">
-            <a:schemeClr val="lt1"/>
-          </a:fontRef>
-        </p:style>
-        <p:txBody>
-          <a:bodyPr rtlCol="0" anchor="ctr"/>
-          <a:lstStyle/>
-          <a:p>
-            <a:pPr algn="ctr"/>
-            <a:endParaRPr lang="ko-KR" altLang="en-US" dirty="0"/>
-          </a:p>
-        </p:txBody>
-      </p:sp>
-      <p:sp>
-        <p:nvSpPr>
-          <p:cNvPr id="15" name="직사각형 14">
-            <a:extLst>
-              <a:ext uri="{FF2B5EF4-FFF2-40B4-BE49-F238E27FC236}">
-                <a16:creationId xmlns:a16="http://schemas.microsoft.com/office/drawing/2014/main" id="{32153B84-0BEC-E588-96E4-F295C12DA15D}"/>
-              </a:ext>
-            </a:extLst>
-          </p:cNvPr>
-          <p:cNvSpPr/>
-          <p:nvPr/>
-        </p:nvSpPr>
-        <p:spPr>
-          <a:xfrm>
-            <a:off x="2672421" y="5768898"/>
-            <a:ext cx="6993731" cy="658022"/>
-          </a:xfrm>
-          <a:prstGeom prst="rect">
-            <a:avLst/>
-          </a:prstGeom>
-          <a:noFill/>
-          <a:ln>
-            <a:solidFill>
-              <a:srgbClr val="FF0000"/>
-            </a:solidFill>
-          </a:ln>
-        </p:spPr>
-        <p:style>
-          <a:lnRef idx="2">
-            <a:schemeClr val="accent1">
-              <a:shade val="15000"/>
-            </a:schemeClr>
-          </a:lnRef>
-          <a:fillRef idx="1">
-            <a:schemeClr val="accent1"/>
-          </a:fillRef>
-          <a:effectRef idx="0">
-            <a:schemeClr val="accent1"/>
-          </a:effectRef>
-          <a:fontRef idx="minor">
-            <a:schemeClr val="lt1"/>
-          </a:fontRef>
-        </p:style>
-        <p:txBody>
-          <a:bodyPr rtlCol="0" anchor="ctr"/>
-          <a:lstStyle/>
-          <a:p>
-            <a:pPr algn="ctr"/>
-            <a:endParaRPr lang="ko-KR" altLang="en-US" dirty="0"/>
-          </a:p>
-        </p:txBody>
-      </p:sp>
-      <p:sp>
-        <p:nvSpPr>
-          <p:cNvPr id="16" name="설명선: 굽은 이중선 15">
-            <a:extLst>
-              <a:ext uri="{FF2B5EF4-FFF2-40B4-BE49-F238E27FC236}">
-                <a16:creationId xmlns:a16="http://schemas.microsoft.com/office/drawing/2014/main" id="{3ECF7EC8-3F0B-385B-E16D-B2F7CF19276C}"/>
-              </a:ext>
-            </a:extLst>
-          </p:cNvPr>
-          <p:cNvSpPr/>
-          <p:nvPr/>
-        </p:nvSpPr>
-        <p:spPr>
-          <a:xfrm>
-            <a:off x="5612200" y="4810612"/>
-            <a:ext cx="1501697" cy="313050"/>
-          </a:xfrm>
-          <a:prstGeom prst="borderCallout3">
-            <a:avLst>
-              <a:gd name="adj1" fmla="val 18750"/>
-              <a:gd name="adj2" fmla="val -8333"/>
-              <a:gd name="adj3" fmla="val 18750"/>
-              <a:gd name="adj4" fmla="val -16667"/>
-              <a:gd name="adj5" fmla="val 100000"/>
-              <a:gd name="adj6" fmla="val -16667"/>
-              <a:gd name="adj7" fmla="val 175276"/>
-              <a:gd name="adj8" fmla="val -3178"/>
-            </a:avLst>
-          </a:prstGeom>
-        </p:spPr>
-        <p:style>
-          <a:lnRef idx="2">
             <a:schemeClr val="accent1"/>
           </a:lnRef>
           <a:fillRef idx="1">
@@ -5012,73 +4634,364 @@
           <a:lstStyle/>
           <a:p>
             <a:pPr algn="ctr"/>
-            <a:r>
-              <a:rPr lang="en-US" altLang="ko-KR" sz="1000" dirty="0"/>
+            <a:endParaRPr lang="ko-KR" altLang="en-US" sz="1000" dirty="0"/>
+          </a:p>
+        </p:txBody>
+      </p:sp>
+      <p:sp>
+        <p:nvSpPr>
+          <p:cNvPr id="10" name="TextBox 9">
+            <a:extLst>
+              <a:ext uri="{FF2B5EF4-FFF2-40B4-BE49-F238E27FC236}">
+                <a16:creationId xmlns:a16="http://schemas.microsoft.com/office/drawing/2014/main" id="{B08EA80D-8E29-2362-6957-A5EA0B960C57}"/>
+              </a:ext>
+            </a:extLst>
+          </p:cNvPr>
+          <p:cNvSpPr txBox="1"/>
+          <p:nvPr/>
+        </p:nvSpPr>
+        <p:spPr>
+          <a:xfrm>
+            <a:off x="4383024" y="1582057"/>
+            <a:ext cx="1031051" cy="261610"/>
+          </a:xfrm>
+          <a:prstGeom prst="rect">
+            <a:avLst/>
+          </a:prstGeom>
+          <a:noFill/>
+        </p:spPr>
+        <p:txBody>
+          <a:bodyPr wrap="none" rtlCol="0">
+            <a:spAutoFit/>
+          </a:bodyPr>
+          <a:lstStyle/>
+          <a:p>
+            <a:pPr algn="l"/>
+            <a:r>
+              <a:rPr lang="ko-KR" altLang="en-US" sz="1100">
+                <a:solidFill>
+                  <a:srgbClr val="FF0000"/>
+                </a:solidFill>
+              </a:rPr>
+              <a:t>들여오기섹션</a:t>
+            </a:r>
+            <a:endParaRPr lang="ko-KR" altLang="en-US" sz="1100" dirty="0">
+              <a:solidFill>
+                <a:srgbClr val="FF0000"/>
+              </a:solidFill>
+            </a:endParaRPr>
+          </a:p>
+        </p:txBody>
+      </p:sp>
+      <p:sp>
+        <p:nvSpPr>
+          <p:cNvPr id="11" name="TextBox 10">
+            <a:extLst>
+              <a:ext uri="{FF2B5EF4-FFF2-40B4-BE49-F238E27FC236}">
+                <a16:creationId xmlns:a16="http://schemas.microsoft.com/office/drawing/2014/main" id="{36B5FFBA-D0AE-831B-5316-8C5528C2F96B}"/>
+              </a:ext>
+            </a:extLst>
+          </p:cNvPr>
+          <p:cNvSpPr txBox="1"/>
+          <p:nvPr/>
+        </p:nvSpPr>
+        <p:spPr>
+          <a:xfrm>
+            <a:off x="6654294" y="1582057"/>
+            <a:ext cx="1362874" cy="261610"/>
+          </a:xfrm>
+          <a:prstGeom prst="rect">
+            <a:avLst/>
+          </a:prstGeom>
+          <a:noFill/>
+        </p:spPr>
+        <p:txBody>
+          <a:bodyPr wrap="none" rtlCol="0">
+            <a:spAutoFit/>
+          </a:bodyPr>
+          <a:lstStyle/>
+          <a:p>
+            <a:pPr algn="l"/>
+            <a:r>
+              <a:rPr lang="ko-KR" altLang="en-US" sz="1100">
+                <a:solidFill>
+                  <a:srgbClr val="FF0000"/>
+                </a:solidFill>
+              </a:rPr>
+              <a:t>연계정보 </a:t>
+            </a:r>
+            <a:r>
+              <a:rPr lang="ko-KR" altLang="en-US" sz="1100" dirty="0" err="1">
+                <a:solidFill>
+                  <a:srgbClr val="FF0000"/>
+                </a:solidFill>
+              </a:rPr>
+              <a:t>버튼섹션</a:t>
+            </a:r>
+            <a:endParaRPr lang="ko-KR" altLang="en-US" sz="1100" dirty="0">
+              <a:solidFill>
+                <a:srgbClr val="FF0000"/>
+              </a:solidFill>
+            </a:endParaRPr>
+          </a:p>
+        </p:txBody>
+      </p:sp>
+      <p:sp>
+        <p:nvSpPr>
+          <p:cNvPr id="12" name="TextBox 11">
+            <a:extLst>
+              <a:ext uri="{FF2B5EF4-FFF2-40B4-BE49-F238E27FC236}">
+                <a16:creationId xmlns:a16="http://schemas.microsoft.com/office/drawing/2014/main" id="{F866E4DA-E62D-DD7B-0DEB-999BA845AF11}"/>
+              </a:ext>
+            </a:extLst>
+          </p:cNvPr>
+          <p:cNvSpPr txBox="1"/>
+          <p:nvPr/>
+        </p:nvSpPr>
+        <p:spPr>
+          <a:xfrm>
+            <a:off x="8735677" y="1601499"/>
+            <a:ext cx="1412566" cy="261610"/>
+          </a:xfrm>
+          <a:prstGeom prst="rect">
+            <a:avLst/>
+          </a:prstGeom>
+          <a:noFill/>
+        </p:spPr>
+        <p:txBody>
+          <a:bodyPr wrap="none" rtlCol="0">
+            <a:spAutoFit/>
+          </a:bodyPr>
+          <a:lstStyle/>
+          <a:p>
+            <a:pPr algn="l"/>
+            <a:r>
+              <a:rPr lang="ko-KR" altLang="en-US" sz="1100">
+                <a:solidFill>
+                  <a:srgbClr val="FF0000"/>
+                </a:solidFill>
+              </a:rPr>
+              <a:t>연계된 폼 </a:t>
+            </a:r>
+            <a:r>
+              <a:rPr lang="ko-KR" altLang="en-US" sz="1100" dirty="0" err="1">
+                <a:solidFill>
+                  <a:srgbClr val="FF0000"/>
+                </a:solidFill>
+              </a:rPr>
+              <a:t>버튼섹션</a:t>
+            </a:r>
+            <a:endParaRPr lang="ko-KR" altLang="en-US" sz="1100" dirty="0">
+              <a:solidFill>
+                <a:srgbClr val="FF0000"/>
+              </a:solidFill>
+            </a:endParaRPr>
+          </a:p>
+        </p:txBody>
+      </p:sp>
+      <p:sp>
+        <p:nvSpPr>
+          <p:cNvPr id="13" name="TextBox 12">
+            <a:extLst>
+              <a:ext uri="{FF2B5EF4-FFF2-40B4-BE49-F238E27FC236}">
+                <a16:creationId xmlns:a16="http://schemas.microsoft.com/office/drawing/2014/main" id="{DDBBDFC5-E157-04F5-F63F-E8BDE6B2786A}"/>
+              </a:ext>
+            </a:extLst>
+          </p:cNvPr>
+          <p:cNvSpPr txBox="1"/>
+          <p:nvPr/>
+        </p:nvSpPr>
+        <p:spPr>
+          <a:xfrm>
+            <a:off x="2962765" y="2401787"/>
+            <a:ext cx="1080745" cy="261610"/>
+          </a:xfrm>
+          <a:prstGeom prst="rect">
+            <a:avLst/>
+          </a:prstGeom>
+          <a:noFill/>
+        </p:spPr>
+        <p:txBody>
+          <a:bodyPr wrap="none" rtlCol="0">
+            <a:spAutoFit/>
+          </a:bodyPr>
+          <a:lstStyle/>
+          <a:p>
+            <a:pPr algn="l"/>
+            <a:r>
+              <a:rPr lang="ko-KR" altLang="en-US" sz="1100" dirty="0">
+                <a:solidFill>
+                  <a:srgbClr val="FF0000"/>
+                </a:solidFill>
+              </a:rPr>
+              <a:t>연계 </a:t>
+            </a:r>
+            <a:r>
+              <a:rPr lang="ko-KR" altLang="en-US" sz="1100" dirty="0" err="1">
+                <a:solidFill>
+                  <a:srgbClr val="FF0000"/>
+                </a:solidFill>
+              </a:rPr>
+              <a:t>옵션섹션</a:t>
+            </a:r>
+            <a:endParaRPr lang="ko-KR" altLang="en-US" sz="1100" dirty="0">
+              <a:solidFill>
+                <a:srgbClr val="FF0000"/>
+              </a:solidFill>
+            </a:endParaRPr>
+          </a:p>
+        </p:txBody>
+      </p:sp>
+      <p:sp>
+        <p:nvSpPr>
+          <p:cNvPr id="14" name="TextBox 13">
+            <a:extLst>
+              <a:ext uri="{FF2B5EF4-FFF2-40B4-BE49-F238E27FC236}">
+                <a16:creationId xmlns:a16="http://schemas.microsoft.com/office/drawing/2014/main" id="{7E98F047-3A81-1E6D-92FE-A46FA60D0814}"/>
+              </a:ext>
+            </a:extLst>
+          </p:cNvPr>
+          <p:cNvSpPr txBox="1"/>
+          <p:nvPr/>
+        </p:nvSpPr>
+        <p:spPr>
+          <a:xfrm>
+            <a:off x="7634642" y="2381195"/>
+            <a:ext cx="1080745" cy="261610"/>
+          </a:xfrm>
+          <a:prstGeom prst="rect">
+            <a:avLst/>
+          </a:prstGeom>
+          <a:noFill/>
+        </p:spPr>
+        <p:txBody>
+          <a:bodyPr wrap="none" rtlCol="0">
+            <a:spAutoFit/>
+          </a:bodyPr>
+          <a:lstStyle/>
+          <a:p>
+            <a:pPr algn="l"/>
+            <a:r>
+              <a:rPr lang="ko-KR" altLang="en-US" sz="1100" dirty="0">
+                <a:solidFill>
+                  <a:srgbClr val="FF0000"/>
+                </a:solidFill>
+              </a:rPr>
+              <a:t>연계 </a:t>
+            </a:r>
+            <a:r>
+              <a:rPr lang="ko-KR" altLang="en-US" sz="1100" dirty="0" err="1">
+                <a:solidFill>
+                  <a:srgbClr val="FF0000"/>
+                </a:solidFill>
+              </a:rPr>
+              <a:t>상태섹션</a:t>
+            </a:r>
+            <a:endParaRPr lang="ko-KR" altLang="en-US" sz="1100" dirty="0">
+              <a:solidFill>
+                <a:srgbClr val="FF0000"/>
+              </a:solidFill>
+            </a:endParaRPr>
+          </a:p>
+        </p:txBody>
+      </p:sp>
+      <p:sp>
+        <p:nvSpPr>
+          <p:cNvPr id="15" name="TextBox 14">
+            <a:extLst>
+              <a:ext uri="{FF2B5EF4-FFF2-40B4-BE49-F238E27FC236}">
+                <a16:creationId xmlns:a16="http://schemas.microsoft.com/office/drawing/2014/main" id="{278DFA67-EF27-794D-9E22-308936071D44}"/>
+              </a:ext>
+            </a:extLst>
+          </p:cNvPr>
+          <p:cNvSpPr txBox="1"/>
+          <p:nvPr/>
+        </p:nvSpPr>
+        <p:spPr>
+          <a:xfrm>
+            <a:off x="2568866" y="3637044"/>
+            <a:ext cx="1271502" cy="261610"/>
+          </a:xfrm>
+          <a:prstGeom prst="rect">
+            <a:avLst/>
+          </a:prstGeom>
+          <a:noFill/>
+        </p:spPr>
+        <p:txBody>
+          <a:bodyPr wrap="none" rtlCol="0">
+            <a:spAutoFit/>
+          </a:bodyPr>
+          <a:lstStyle/>
+          <a:p>
+            <a:pPr algn="l"/>
+            <a:r>
+              <a:rPr lang="ko-KR" altLang="en-US" sz="1100" dirty="0">
+                <a:solidFill>
+                  <a:srgbClr val="FF0000"/>
+                </a:solidFill>
+              </a:rPr>
+              <a:t>연계 폼 </a:t>
+            </a:r>
+            <a:r>
+              <a:rPr lang="ko-KR" altLang="en-US" sz="1100" dirty="0" err="1">
+                <a:solidFill>
+                  <a:srgbClr val="FF0000"/>
+                </a:solidFill>
+              </a:rPr>
+              <a:t>정보섹션</a:t>
+            </a:r>
+            <a:endParaRPr lang="ko-KR" altLang="en-US" sz="1100" dirty="0">
+              <a:solidFill>
+                <a:srgbClr val="FF0000"/>
+              </a:solidFill>
+            </a:endParaRPr>
+          </a:p>
+        </p:txBody>
+      </p:sp>
+      <p:sp>
+        <p:nvSpPr>
+          <p:cNvPr id="16" name="TextBox 15">
+            <a:extLst>
+              <a:ext uri="{FF2B5EF4-FFF2-40B4-BE49-F238E27FC236}">
+                <a16:creationId xmlns:a16="http://schemas.microsoft.com/office/drawing/2014/main" id="{185884E0-D250-469B-26B3-1C6EFB043247}"/>
+              </a:ext>
+            </a:extLst>
+          </p:cNvPr>
+          <p:cNvSpPr txBox="1"/>
+          <p:nvPr/>
+        </p:nvSpPr>
+        <p:spPr>
+          <a:xfrm>
+            <a:off x="420624" y="323088"/>
+            <a:ext cx="2528256" cy="261610"/>
+          </a:xfrm>
+          <a:prstGeom prst="rect">
+            <a:avLst/>
+          </a:prstGeom>
+          <a:noFill/>
+        </p:spPr>
+        <p:txBody>
+          <a:bodyPr wrap="none" rtlCol="0">
+            <a:spAutoFit/>
+          </a:bodyPr>
+          <a:lstStyle/>
+          <a:p>
+            <a:pPr algn="l"/>
+            <a:r>
+              <a:rPr lang="en-US" altLang="ko-KR" sz="1100" dirty="0"/>
               <a:t>CRF </a:t>
             </a:r>
             <a:r>
-              <a:rPr lang="ko-KR" altLang="en-US" sz="1000" dirty="0"/>
-              <a:t>폼 들여오기 섹션</a:t>
-            </a:r>
-          </a:p>
-        </p:txBody>
-      </p:sp>
-      <p:sp>
-        <p:nvSpPr>
-          <p:cNvPr id="17" name="설명선: 굽은 이중선 16">
-            <a:extLst>
-              <a:ext uri="{FF2B5EF4-FFF2-40B4-BE49-F238E27FC236}">
-                <a16:creationId xmlns:a16="http://schemas.microsoft.com/office/drawing/2014/main" id="{9CECA056-4311-4CEB-5239-9E55FB52EA17}"/>
-              </a:ext>
-            </a:extLst>
-          </p:cNvPr>
-          <p:cNvSpPr/>
-          <p:nvPr/>
-        </p:nvSpPr>
-        <p:spPr>
-          <a:xfrm>
-            <a:off x="7582862" y="4845497"/>
-            <a:ext cx="850345" cy="313050"/>
-          </a:xfrm>
-          <a:prstGeom prst="borderCallout3">
-            <a:avLst>
-              <a:gd name="adj1" fmla="val 18750"/>
-              <a:gd name="adj2" fmla="val -8333"/>
-              <a:gd name="adj3" fmla="val 18750"/>
-              <a:gd name="adj4" fmla="val -16667"/>
-              <a:gd name="adj5" fmla="val 102282"/>
-              <a:gd name="adj6" fmla="val -22548"/>
-              <a:gd name="adj7" fmla="val 157020"/>
-              <a:gd name="adj8" fmla="val -4018"/>
-            </a:avLst>
-          </a:prstGeom>
-        </p:spPr>
-        <p:style>
-          <a:lnRef idx="2">
-            <a:schemeClr val="accent1"/>
-          </a:lnRef>
-          <a:fillRef idx="1">
-            <a:schemeClr val="lt1"/>
-          </a:fillRef>
-          <a:effectRef idx="0">
-            <a:schemeClr val="accent1"/>
-          </a:effectRef>
-          <a:fontRef idx="minor">
-            <a:schemeClr val="dk1"/>
-          </a:fontRef>
-        </p:style>
-        <p:txBody>
-          <a:bodyPr rtlCol="0" anchor="ctr"/>
-          <a:lstStyle/>
-          <a:p>
-            <a:pPr algn="ctr"/>
-            <a:r>
-              <a:rPr lang="ko-KR" altLang="en-US" sz="1000"/>
-              <a:t>버튼 </a:t>
-            </a:r>
-            <a:r>
-              <a:rPr lang="ko-KR" altLang="en-US" sz="1000" dirty="0"/>
-              <a:t>섹션</a:t>
+              <a:rPr lang="ko-KR" altLang="en-US" sz="1100" dirty="0"/>
+              <a:t>편집기의 연계 </a:t>
+            </a:r>
+            <a:r>
+              <a:rPr lang="en-US" altLang="ko-KR" sz="1100" dirty="0"/>
+              <a:t>CRF </a:t>
+            </a:r>
+            <a:r>
+              <a:rPr lang="ko-KR" altLang="en-US" sz="1100" dirty="0"/>
+              <a:t>폼 정보 화면</a:t>
             </a:r>
           </a:p>
         </p:txBody>
@@ -5086,7 +4999,7 @@
     </p:spTree>
     <p:extLst>
       <p:ext uri="{BB962C8B-B14F-4D97-AF65-F5344CB8AC3E}">
-        <p14:creationId xmlns:p14="http://schemas.microsoft.com/office/powerpoint/2010/main" val="2536856654"/>
+        <p14:creationId xmlns:p14="http://schemas.microsoft.com/office/powerpoint/2010/main" val="941236484"/>
       </p:ext>
     </p:extLst>
   </p:cSld>
@@ -5118,7 +5031,7 @@
           <p:cNvPr id="3" name="그림 2">
             <a:extLst>
               <a:ext uri="{FF2B5EF4-FFF2-40B4-BE49-F238E27FC236}">
-                <a16:creationId xmlns:a16="http://schemas.microsoft.com/office/drawing/2014/main" id="{F979E7C0-C5AB-4CB5-5D49-0D0707F88D54}"/>
+                <a16:creationId xmlns:a16="http://schemas.microsoft.com/office/drawing/2014/main" id="{AA656A62-5527-9B46-061F-89FD89A26BCC}"/>
               </a:ext>
             </a:extLst>
           </p:cNvPr>
@@ -5135,8 +5048,8 @@
         </p:blipFill>
         <p:spPr>
           <a:xfrm>
-            <a:off x="2177791" y="1047036"/>
-            <a:ext cx="7958337" cy="5130294"/>
+            <a:off x="2637401" y="1151644"/>
+            <a:ext cx="7093162" cy="5268047"/>
           </a:xfrm>
           <a:prstGeom prst="rect">
             <a:avLst/>
@@ -5148,7 +5061,7 @@
           <p:cNvPr id="4" name="TextBox 3">
             <a:extLst>
               <a:ext uri="{FF2B5EF4-FFF2-40B4-BE49-F238E27FC236}">
-                <a16:creationId xmlns:a16="http://schemas.microsoft.com/office/drawing/2014/main" id="{38F827FE-3014-487C-2B13-EEAE438A9477}"/>
+                <a16:creationId xmlns:a16="http://schemas.microsoft.com/office/drawing/2014/main" id="{47148512-BEC1-D406-5FBC-6ED2C2EBA59C}"/>
               </a:ext>
             </a:extLst>
           </p:cNvPr>
@@ -5157,8 +5070,8 @@
         </p:nvSpPr>
         <p:spPr>
           <a:xfrm>
-            <a:off x="243840" y="170688"/>
-            <a:ext cx="1590500" cy="369332"/>
+            <a:off x="143584" y="253643"/>
+            <a:ext cx="2887329" cy="369332"/>
           </a:xfrm>
           <a:prstGeom prst="rect">
             <a:avLst/>
@@ -5172,12 +5085,8 @@
           <a:lstStyle/>
           <a:p>
             <a:r>
-              <a:rPr lang="en-US" altLang="ko-KR" dirty="0"/>
-              <a:t>[5] </a:t>
-            </a:r>
-            <a:r>
-              <a:rPr lang="ko-KR" altLang="en-US" dirty="0"/>
-              <a:t>수정 화면</a:t>
+              <a:rPr lang="ko-KR" altLang="en-US"/>
+              <a:t>데이터타입 들여오기 화면</a:t>
             </a:r>
           </a:p>
         </p:txBody>
@@ -5187,7 +5096,7 @@
           <p:cNvPr id="5" name="직사각형 4">
             <a:extLst>
               <a:ext uri="{FF2B5EF4-FFF2-40B4-BE49-F238E27FC236}">
-                <a16:creationId xmlns:a16="http://schemas.microsoft.com/office/drawing/2014/main" id="{7A593FBD-3A2D-3971-93A8-46260989D4F4}"/>
+                <a16:creationId xmlns:a16="http://schemas.microsoft.com/office/drawing/2014/main" id="{B3A8BEBE-C817-C94D-A93B-608000E2B6AD}"/>
               </a:ext>
             </a:extLst>
           </p:cNvPr>
@@ -5196,8 +5105,8 @@
         </p:nvSpPr>
         <p:spPr>
           <a:xfrm>
-            <a:off x="6355748" y="1047036"/>
-            <a:ext cx="2855308" cy="374830"/>
+            <a:off x="4776431" y="1151644"/>
+            <a:ext cx="1518571" cy="374830"/>
           </a:xfrm>
           <a:prstGeom prst="rect">
             <a:avLst/>
@@ -5236,10 +5145,10 @@
       </p:sp>
       <p:sp>
         <p:nvSpPr>
-          <p:cNvPr id="6" name="직사각형 5">
-            <a:extLst>
-              <a:ext uri="{FF2B5EF4-FFF2-40B4-BE49-F238E27FC236}">
-                <a16:creationId xmlns:a16="http://schemas.microsoft.com/office/drawing/2014/main" id="{D3AFD817-94D7-AE5B-B516-5904FF3D5483}"/>
+          <p:cNvPr id="6" name="설명선: 굽은 이중선 5">
+            <a:extLst>
+              <a:ext uri="{FF2B5EF4-FFF2-40B4-BE49-F238E27FC236}">
+                <a16:creationId xmlns:a16="http://schemas.microsoft.com/office/drawing/2014/main" id="{AD67BFFE-1A36-B062-3BA7-03C582CA96B9}"/>
               </a:ext>
             </a:extLst>
           </p:cNvPr>
@@ -5248,8 +5157,68 @@
         </p:nvSpPr>
         <p:spPr>
           <a:xfrm>
-            <a:off x="9287924" y="1047036"/>
-            <a:ext cx="726285" cy="374830"/>
+            <a:off x="4857958" y="609464"/>
+            <a:ext cx="1349554" cy="313050"/>
+          </a:xfrm>
+          <a:prstGeom prst="borderCallout3">
+            <a:avLst>
+              <a:gd name="adj1" fmla="val 18750"/>
+              <a:gd name="adj2" fmla="val -8333"/>
+              <a:gd name="adj3" fmla="val 18750"/>
+              <a:gd name="adj4" fmla="val -16667"/>
+              <a:gd name="adj5" fmla="val 100000"/>
+              <a:gd name="adj6" fmla="val -16667"/>
+              <a:gd name="adj7" fmla="val 175276"/>
+              <a:gd name="adj8" fmla="val -3178"/>
+            </a:avLst>
+          </a:prstGeom>
+        </p:spPr>
+        <p:style>
+          <a:lnRef idx="2">
+            <a:schemeClr val="accent1"/>
+          </a:lnRef>
+          <a:fillRef idx="1">
+            <a:schemeClr val="lt1"/>
+          </a:fillRef>
+          <a:effectRef idx="0">
+            <a:schemeClr val="accent1"/>
+          </a:effectRef>
+          <a:fontRef idx="minor">
+            <a:schemeClr val="dk1"/>
+          </a:fontRef>
+        </p:style>
+        <p:txBody>
+          <a:bodyPr rtlCol="0" anchor="ctr"/>
+          <a:lstStyle/>
+          <a:p>
+            <a:pPr algn="ctr"/>
+            <a:r>
+              <a:rPr lang="en-US" altLang="ko-KR" sz="1000" dirty="0"/>
+              <a:t>CRF </a:t>
+            </a:r>
+            <a:r>
+              <a:rPr lang="ko-KR" altLang="en-US" sz="1000" dirty="0"/>
+              <a:t>들여오기 섹션</a:t>
+            </a:r>
+          </a:p>
+        </p:txBody>
+      </p:sp>
+      <p:sp>
+        <p:nvSpPr>
+          <p:cNvPr id="7" name="직사각형 6">
+            <a:extLst>
+              <a:ext uri="{FF2B5EF4-FFF2-40B4-BE49-F238E27FC236}">
+                <a16:creationId xmlns:a16="http://schemas.microsoft.com/office/drawing/2014/main" id="{BEEBEF4C-9208-159E-A20F-21417C4DA9B8}"/>
+              </a:ext>
+            </a:extLst>
+          </p:cNvPr>
+          <p:cNvSpPr/>
+          <p:nvPr/>
+        </p:nvSpPr>
+        <p:spPr>
+          <a:xfrm>
+            <a:off x="6285507" y="1151644"/>
+            <a:ext cx="2594711" cy="374830"/>
           </a:xfrm>
           <a:prstGeom prst="rect">
             <a:avLst/>
@@ -5288,10 +5257,10 @@
       </p:sp>
       <p:sp>
         <p:nvSpPr>
-          <p:cNvPr id="7" name="직사각형 6">
-            <a:extLst>
-              <a:ext uri="{FF2B5EF4-FFF2-40B4-BE49-F238E27FC236}">
-                <a16:creationId xmlns:a16="http://schemas.microsoft.com/office/drawing/2014/main" id="{E3EB763A-D70B-80FE-A388-9985950DE1E5}"/>
+          <p:cNvPr id="8" name="설명선: 굽은 이중선 7">
+            <a:extLst>
+              <a:ext uri="{FF2B5EF4-FFF2-40B4-BE49-F238E27FC236}">
+                <a16:creationId xmlns:a16="http://schemas.microsoft.com/office/drawing/2014/main" id="{0722593F-EB3F-B477-B639-5FBB5357F0E0}"/>
               </a:ext>
             </a:extLst>
           </p:cNvPr>
@@ -5300,8 +5269,68 @@
         </p:nvSpPr>
         <p:spPr>
           <a:xfrm>
-            <a:off x="2177791" y="1560576"/>
-            <a:ext cx="2855308" cy="236120"/>
+            <a:off x="6732517" y="631089"/>
+            <a:ext cx="850345" cy="313050"/>
+          </a:xfrm>
+          <a:prstGeom prst="borderCallout3">
+            <a:avLst>
+              <a:gd name="adj1" fmla="val 18750"/>
+              <a:gd name="adj2" fmla="val -8333"/>
+              <a:gd name="adj3" fmla="val 18750"/>
+              <a:gd name="adj4" fmla="val -16667"/>
+              <a:gd name="adj5" fmla="val 102282"/>
+              <a:gd name="adj6" fmla="val -22548"/>
+              <a:gd name="adj7" fmla="val 157020"/>
+              <a:gd name="adj8" fmla="val -4018"/>
+            </a:avLst>
+          </a:prstGeom>
+        </p:spPr>
+        <p:style>
+          <a:lnRef idx="2">
+            <a:schemeClr val="accent1"/>
+          </a:lnRef>
+          <a:fillRef idx="1">
+            <a:schemeClr val="lt1"/>
+          </a:fillRef>
+          <a:effectRef idx="0">
+            <a:schemeClr val="accent1"/>
+          </a:effectRef>
+          <a:fontRef idx="minor">
+            <a:schemeClr val="dk1"/>
+          </a:fontRef>
+        </p:style>
+        <p:txBody>
+          <a:bodyPr rtlCol="0" anchor="ctr"/>
+          <a:lstStyle/>
+          <a:p>
+            <a:pPr algn="ctr"/>
+            <a:r>
+              <a:rPr lang="ko-KR" altLang="en-US" sz="1000"/>
+              <a:t>버튼 </a:t>
+            </a:r>
+            <a:r>
+              <a:rPr lang="ko-KR" altLang="en-US" sz="1000" dirty="0"/>
+              <a:t>섹션</a:t>
+            </a:r>
+          </a:p>
+        </p:txBody>
+      </p:sp>
+      <p:sp>
+        <p:nvSpPr>
+          <p:cNvPr id="9" name="직사각형 8">
+            <a:extLst>
+              <a:ext uri="{FF2B5EF4-FFF2-40B4-BE49-F238E27FC236}">
+                <a16:creationId xmlns:a16="http://schemas.microsoft.com/office/drawing/2014/main" id="{3FD39C2C-F898-1505-359A-86CAA36C123B}"/>
+              </a:ext>
+            </a:extLst>
+          </p:cNvPr>
+          <p:cNvSpPr/>
+          <p:nvPr/>
+        </p:nvSpPr>
+        <p:spPr>
+          <a:xfrm>
+            <a:off x="8949671" y="1164336"/>
+            <a:ext cx="612119" cy="362138"/>
           </a:xfrm>
           <a:prstGeom prst="rect">
             <a:avLst/>
@@ -5340,10 +5369,10 @@
       </p:sp>
       <p:sp>
         <p:nvSpPr>
-          <p:cNvPr id="8" name="직사각형 7">
-            <a:extLst>
-              <a:ext uri="{FF2B5EF4-FFF2-40B4-BE49-F238E27FC236}">
-                <a16:creationId xmlns:a16="http://schemas.microsoft.com/office/drawing/2014/main" id="{14DCA2E7-1F6C-6368-2D5A-661D1E1227DE}"/>
+          <p:cNvPr id="10" name="설명선: 굽은 이중선 9">
+            <a:extLst>
+              <a:ext uri="{FF2B5EF4-FFF2-40B4-BE49-F238E27FC236}">
+                <a16:creationId xmlns:a16="http://schemas.microsoft.com/office/drawing/2014/main" id="{CFD371B4-CB98-896F-76C1-B99018277526}"/>
               </a:ext>
             </a:extLst>
           </p:cNvPr>
@@ -5352,8 +5381,68 @@
         </p:nvSpPr>
         <p:spPr>
           <a:xfrm>
-            <a:off x="2177790" y="1865376"/>
-            <a:ext cx="7911089" cy="3614928"/>
+            <a:off x="8477536" y="578317"/>
+            <a:ext cx="1153596" cy="313050"/>
+          </a:xfrm>
+          <a:prstGeom prst="borderCallout3">
+            <a:avLst>
+              <a:gd name="adj1" fmla="val 97569"/>
+              <a:gd name="adj2" fmla="val 42623"/>
+              <a:gd name="adj3" fmla="val 125388"/>
+              <a:gd name="adj4" fmla="val 47501"/>
+              <a:gd name="adj5" fmla="val 148646"/>
+              <a:gd name="adj6" fmla="val 57975"/>
+              <a:gd name="adj7" fmla="val 183178"/>
+              <a:gd name="adj8" fmla="val 64116"/>
+            </a:avLst>
+          </a:prstGeom>
+        </p:spPr>
+        <p:style>
+          <a:lnRef idx="2">
+            <a:schemeClr val="accent1"/>
+          </a:lnRef>
+          <a:fillRef idx="1">
+            <a:schemeClr val="lt1"/>
+          </a:fillRef>
+          <a:effectRef idx="0">
+            <a:schemeClr val="accent1"/>
+          </a:effectRef>
+          <a:fontRef idx="minor">
+            <a:schemeClr val="dk1"/>
+          </a:fontRef>
+        </p:style>
+        <p:txBody>
+          <a:bodyPr rtlCol="0" anchor="ctr"/>
+          <a:lstStyle/>
+          <a:p>
+            <a:pPr algn="ctr"/>
+            <a:r>
+              <a:rPr lang="ko-KR" altLang="en-US" sz="1000"/>
+              <a:t>리다이렉트</a:t>
+            </a:r>
+            <a:r>
+              <a:rPr lang="ko-KR" altLang="en-US" sz="1000" dirty="0"/>
+              <a:t> 섹션</a:t>
+            </a:r>
+          </a:p>
+        </p:txBody>
+      </p:sp>
+      <p:sp>
+        <p:nvSpPr>
+          <p:cNvPr id="11" name="직사각형 10">
+            <a:extLst>
+              <a:ext uri="{FF2B5EF4-FFF2-40B4-BE49-F238E27FC236}">
+                <a16:creationId xmlns:a16="http://schemas.microsoft.com/office/drawing/2014/main" id="{57EC87C8-3CDF-792D-D14C-67492BB9EA2A}"/>
+              </a:ext>
+            </a:extLst>
+          </p:cNvPr>
+          <p:cNvSpPr/>
+          <p:nvPr/>
+        </p:nvSpPr>
+        <p:spPr>
+          <a:xfrm>
+            <a:off x="2637401" y="1573281"/>
+            <a:ext cx="6993731" cy="3550381"/>
           </a:xfrm>
           <a:prstGeom prst="rect">
             <a:avLst/>
@@ -5392,10 +5481,57 @@
       </p:sp>
       <p:sp>
         <p:nvSpPr>
-          <p:cNvPr id="9" name="직사각형 8">
-            <a:extLst>
-              <a:ext uri="{FF2B5EF4-FFF2-40B4-BE49-F238E27FC236}">
-                <a16:creationId xmlns:a16="http://schemas.microsoft.com/office/drawing/2014/main" id="{5E87224F-BC8C-C963-C09F-109797013313}"/>
+          <p:cNvPr id="12" name="TextBox 11">
+            <a:extLst>
+              <a:ext uri="{FF2B5EF4-FFF2-40B4-BE49-F238E27FC236}">
+                <a16:creationId xmlns:a16="http://schemas.microsoft.com/office/drawing/2014/main" id="{E2612C44-54A0-5E12-7855-01673C1F9851}"/>
+              </a:ext>
+            </a:extLst>
+          </p:cNvPr>
+          <p:cNvSpPr txBox="1"/>
+          <p:nvPr/>
+        </p:nvSpPr>
+        <p:spPr>
+          <a:xfrm>
+            <a:off x="5204077" y="2692148"/>
+            <a:ext cx="816249" cy="276999"/>
+          </a:xfrm>
+          <a:prstGeom prst="rect">
+            <a:avLst/>
+          </a:prstGeom>
+          <a:noFill/>
+        </p:spPr>
+        <p:txBody>
+          <a:bodyPr wrap="none" rtlCol="0">
+            <a:spAutoFit/>
+          </a:bodyPr>
+          <a:lstStyle/>
+          <a:p>
+            <a:r>
+              <a:rPr lang="en-US" altLang="ko-KR" sz="1200" dirty="0">
+                <a:solidFill>
+                  <a:srgbClr val="C00000"/>
+                </a:solidFill>
+              </a:rPr>
+              <a:t>CRF </a:t>
+            </a:r>
+            <a:r>
+              <a:rPr lang="ko-KR" altLang="en-US" sz="1200" dirty="0">
+                <a:solidFill>
+                  <a:srgbClr val="C00000"/>
+                </a:solidFill>
+              </a:rPr>
+              <a:t>정보</a:t>
+            </a:r>
+          </a:p>
+        </p:txBody>
+      </p:sp>
+      <p:sp>
+        <p:nvSpPr>
+          <p:cNvPr id="13" name="직사각형 12">
+            <a:extLst>
+              <a:ext uri="{FF2B5EF4-FFF2-40B4-BE49-F238E27FC236}">
+                <a16:creationId xmlns:a16="http://schemas.microsoft.com/office/drawing/2014/main" id="{1FF3126D-026E-5B9C-BCC9-A1A48C651BB9}"/>
               </a:ext>
             </a:extLst>
           </p:cNvPr>
@@ -5404,8 +5540,8 @@
         </p:nvSpPr>
         <p:spPr>
           <a:xfrm>
-            <a:off x="7571232" y="5805754"/>
-            <a:ext cx="1639824" cy="320726"/>
+            <a:off x="5352586" y="5360021"/>
+            <a:ext cx="1501697" cy="346336"/>
           </a:xfrm>
           <a:prstGeom prst="rect">
             <a:avLst/>
@@ -5444,10 +5580,10 @@
       </p:sp>
       <p:sp>
         <p:nvSpPr>
-          <p:cNvPr id="10" name="직사각형 9">
-            <a:extLst>
-              <a:ext uri="{FF2B5EF4-FFF2-40B4-BE49-F238E27FC236}">
-                <a16:creationId xmlns:a16="http://schemas.microsoft.com/office/drawing/2014/main" id="{078DE206-5A9E-7770-81C6-B849F297403C}"/>
+          <p:cNvPr id="14" name="직사각형 13">
+            <a:extLst>
+              <a:ext uri="{FF2B5EF4-FFF2-40B4-BE49-F238E27FC236}">
+                <a16:creationId xmlns:a16="http://schemas.microsoft.com/office/drawing/2014/main" id="{A04AF2D7-37E6-635C-34AC-2324F2BF2C4D}"/>
               </a:ext>
             </a:extLst>
           </p:cNvPr>
@@ -5456,8 +5592,8 @@
         </p:nvSpPr>
         <p:spPr>
           <a:xfrm>
-            <a:off x="9268967" y="5805754"/>
-            <a:ext cx="819912" cy="320726"/>
+            <a:off x="6854283" y="5352792"/>
+            <a:ext cx="2776849" cy="346336"/>
           </a:xfrm>
           <a:prstGeom prst="rect">
             <a:avLst/>
@@ -5496,258 +5632,172 @@
       </p:sp>
       <p:sp>
         <p:nvSpPr>
-          <p:cNvPr id="11" name="TextBox 10">
-            <a:extLst>
-              <a:ext uri="{FF2B5EF4-FFF2-40B4-BE49-F238E27FC236}">
-                <a16:creationId xmlns:a16="http://schemas.microsoft.com/office/drawing/2014/main" id="{BEA40A6B-85A3-687C-A9CB-6ACA133E4066}"/>
-              </a:ext>
-            </a:extLst>
-          </p:cNvPr>
-          <p:cNvSpPr txBox="1"/>
-          <p:nvPr/>
-        </p:nvSpPr>
-        <p:spPr>
-          <a:xfrm>
-            <a:off x="6360286" y="1453786"/>
-            <a:ext cx="798617" cy="261610"/>
+          <p:cNvPr id="15" name="직사각형 14">
+            <a:extLst>
+              <a:ext uri="{FF2B5EF4-FFF2-40B4-BE49-F238E27FC236}">
+                <a16:creationId xmlns:a16="http://schemas.microsoft.com/office/drawing/2014/main" id="{32153B84-0BEC-E588-96E4-F295C12DA15D}"/>
+              </a:ext>
+            </a:extLst>
+          </p:cNvPr>
+          <p:cNvSpPr/>
+          <p:nvPr/>
+        </p:nvSpPr>
+        <p:spPr>
+          <a:xfrm>
+            <a:off x="2672421" y="5768898"/>
+            <a:ext cx="6993731" cy="658022"/>
           </a:xfrm>
           <a:prstGeom prst="rect">
             <a:avLst/>
           </a:prstGeom>
           <a:noFill/>
-        </p:spPr>
-        <p:txBody>
-          <a:bodyPr wrap="none" rtlCol="0">
-            <a:spAutoFit/>
-          </a:bodyPr>
-          <a:lstStyle/>
-          <a:p>
-            <a:r>
-              <a:rPr lang="ko-KR" altLang="en-US" sz="1100" dirty="0">
-                <a:solidFill>
-                  <a:srgbClr val="C00000"/>
-                </a:solidFill>
-              </a:rPr>
-              <a:t>버튼 섹션</a:t>
-            </a:r>
-          </a:p>
-        </p:txBody>
-      </p:sp>
-      <p:sp>
-        <p:nvSpPr>
-          <p:cNvPr id="12" name="TextBox 11">
-            <a:extLst>
-              <a:ext uri="{FF2B5EF4-FFF2-40B4-BE49-F238E27FC236}">
-                <a16:creationId xmlns:a16="http://schemas.microsoft.com/office/drawing/2014/main" id="{3D0F3B84-EB67-61B6-1995-5F9D42A96CD7}"/>
-              </a:ext>
-            </a:extLst>
-          </p:cNvPr>
-          <p:cNvSpPr txBox="1"/>
-          <p:nvPr/>
-        </p:nvSpPr>
-        <p:spPr>
-          <a:xfrm>
-            <a:off x="8914319" y="1460364"/>
-            <a:ext cx="1221809" cy="261610"/>
-          </a:xfrm>
-          <a:prstGeom prst="rect">
-            <a:avLst/>
-          </a:prstGeom>
-          <a:noFill/>
-        </p:spPr>
-        <p:txBody>
-          <a:bodyPr wrap="none" rtlCol="0">
-            <a:spAutoFit/>
-          </a:bodyPr>
-          <a:lstStyle/>
-          <a:p>
-            <a:r>
-              <a:rPr lang="ko-KR" altLang="en-US" sz="1100">
-                <a:solidFill>
-                  <a:srgbClr val="C00000"/>
-                </a:solidFill>
-              </a:rPr>
-              <a:t>리다이렉트</a:t>
-            </a:r>
-            <a:r>
-              <a:rPr lang="ko-KR" altLang="en-US" sz="1100" dirty="0">
-                <a:solidFill>
-                  <a:srgbClr val="C00000"/>
-                </a:solidFill>
-              </a:rPr>
-              <a:t> 섹션</a:t>
-            </a:r>
-          </a:p>
-        </p:txBody>
-      </p:sp>
-      <p:sp>
-        <p:nvSpPr>
-          <p:cNvPr id="13" name="TextBox 12">
-            <a:extLst>
-              <a:ext uri="{FF2B5EF4-FFF2-40B4-BE49-F238E27FC236}">
-                <a16:creationId xmlns:a16="http://schemas.microsoft.com/office/drawing/2014/main" id="{DB6E9A13-B388-2203-FA3C-B702CAFB4B62}"/>
-              </a:ext>
-            </a:extLst>
-          </p:cNvPr>
-          <p:cNvSpPr txBox="1"/>
-          <p:nvPr/>
-        </p:nvSpPr>
-        <p:spPr>
-          <a:xfrm>
-            <a:off x="3933887" y="1311384"/>
-            <a:ext cx="939681" cy="261610"/>
-          </a:xfrm>
-          <a:prstGeom prst="rect">
-            <a:avLst/>
-          </a:prstGeom>
-          <a:noFill/>
-        </p:spPr>
-        <p:txBody>
-          <a:bodyPr wrap="none" rtlCol="0">
-            <a:spAutoFit/>
-          </a:bodyPr>
-          <a:lstStyle/>
-          <a:p>
-            <a:r>
-              <a:rPr lang="ko-KR" altLang="en-US" sz="1100" dirty="0">
-                <a:solidFill>
-                  <a:srgbClr val="C00000"/>
-                </a:solidFill>
-              </a:rPr>
-              <a:t>아이디 섹션</a:t>
-            </a:r>
-          </a:p>
-        </p:txBody>
-      </p:sp>
-      <p:sp>
-        <p:nvSpPr>
-          <p:cNvPr id="14" name="TextBox 13">
-            <a:extLst>
-              <a:ext uri="{FF2B5EF4-FFF2-40B4-BE49-F238E27FC236}">
-                <a16:creationId xmlns:a16="http://schemas.microsoft.com/office/drawing/2014/main" id="{03F0865C-6EB0-ACB9-AE9D-F0EB36E12E30}"/>
-              </a:ext>
-            </a:extLst>
-          </p:cNvPr>
-          <p:cNvSpPr txBox="1"/>
-          <p:nvPr/>
-        </p:nvSpPr>
-        <p:spPr>
-          <a:xfrm>
-            <a:off x="5476175" y="3350573"/>
-            <a:ext cx="798617" cy="261610"/>
-          </a:xfrm>
-          <a:prstGeom prst="rect">
-            <a:avLst/>
-          </a:prstGeom>
-          <a:noFill/>
-        </p:spPr>
-        <p:txBody>
-          <a:bodyPr wrap="none" rtlCol="0">
-            <a:spAutoFit/>
-          </a:bodyPr>
-          <a:lstStyle/>
-          <a:p>
-            <a:r>
-              <a:rPr lang="ko-KR" altLang="en-US" sz="1100" dirty="0">
-                <a:solidFill>
-                  <a:srgbClr val="C00000"/>
-                </a:solidFill>
-              </a:rPr>
-              <a:t>입력 섹션</a:t>
-            </a:r>
-          </a:p>
-        </p:txBody>
-      </p:sp>
-      <p:sp>
-        <p:nvSpPr>
-          <p:cNvPr id="15" name="TextBox 14">
-            <a:extLst>
-              <a:ext uri="{FF2B5EF4-FFF2-40B4-BE49-F238E27FC236}">
-                <a16:creationId xmlns:a16="http://schemas.microsoft.com/office/drawing/2014/main" id="{1728FA4D-FD60-BE6A-7C32-38932D4470FD}"/>
-              </a:ext>
-            </a:extLst>
-          </p:cNvPr>
-          <p:cNvSpPr txBox="1"/>
-          <p:nvPr/>
-        </p:nvSpPr>
-        <p:spPr>
-          <a:xfrm>
-            <a:off x="7475663" y="5514226"/>
-            <a:ext cx="1568058" cy="261610"/>
-          </a:xfrm>
-          <a:prstGeom prst="rect">
-            <a:avLst/>
-          </a:prstGeom>
-          <a:noFill/>
-        </p:spPr>
-        <p:txBody>
-          <a:bodyPr wrap="none" rtlCol="0">
-            <a:spAutoFit/>
-          </a:bodyPr>
-          <a:lstStyle/>
-          <a:p>
-            <a:r>
-              <a:rPr lang="en-US" altLang="ko-KR" sz="1100" dirty="0">
-                <a:solidFill>
-                  <a:srgbClr val="C00000"/>
-                </a:solidFill>
-              </a:rPr>
-              <a:t>CRF</a:t>
-            </a:r>
-            <a:r>
-              <a:rPr lang="ko-KR" altLang="en-US" sz="1100" dirty="0">
-                <a:solidFill>
-                  <a:srgbClr val="C00000"/>
-                </a:solidFill>
-              </a:rPr>
-              <a:t> 폼 들여오기 섹션</a:t>
-            </a:r>
-          </a:p>
-        </p:txBody>
-      </p:sp>
-      <p:sp>
-        <p:nvSpPr>
-          <p:cNvPr id="16" name="TextBox 15">
-            <a:extLst>
-              <a:ext uri="{FF2B5EF4-FFF2-40B4-BE49-F238E27FC236}">
-                <a16:creationId xmlns:a16="http://schemas.microsoft.com/office/drawing/2014/main" id="{1056DEC3-8288-F44B-BDBC-635B5BA33562}"/>
-              </a:ext>
-            </a:extLst>
-          </p:cNvPr>
-          <p:cNvSpPr txBox="1"/>
-          <p:nvPr/>
-        </p:nvSpPr>
-        <p:spPr>
-          <a:xfrm>
-            <a:off x="8568070" y="6156398"/>
-            <a:ext cx="1617751" cy="261610"/>
-          </a:xfrm>
-          <a:prstGeom prst="rect">
-            <a:avLst/>
-          </a:prstGeom>
-          <a:noFill/>
-        </p:spPr>
-        <p:txBody>
-          <a:bodyPr wrap="none" rtlCol="0">
-            <a:spAutoFit/>
-          </a:bodyPr>
-          <a:lstStyle/>
-          <a:p>
-            <a:r>
-              <a:rPr lang="en-US" altLang="ko-KR" sz="1100" dirty="0">
-                <a:solidFill>
-                  <a:srgbClr val="C00000"/>
-                </a:solidFill>
-              </a:rPr>
-              <a:t>CRF</a:t>
-            </a:r>
-            <a:r>
-              <a:rPr lang="ko-KR" altLang="en-US" sz="1100" dirty="0">
-                <a:solidFill>
-                  <a:srgbClr val="C00000"/>
-                </a:solidFill>
-              </a:rPr>
-              <a:t> 폼 생성 버튼 섹션</a:t>
+          <a:ln>
+            <a:solidFill>
+              <a:srgbClr val="FF0000"/>
+            </a:solidFill>
+          </a:ln>
+        </p:spPr>
+        <p:style>
+          <a:lnRef idx="2">
+            <a:schemeClr val="accent1">
+              <a:shade val="15000"/>
+            </a:schemeClr>
+          </a:lnRef>
+          <a:fillRef idx="1">
+            <a:schemeClr val="accent1"/>
+          </a:fillRef>
+          <a:effectRef idx="0">
+            <a:schemeClr val="accent1"/>
+          </a:effectRef>
+          <a:fontRef idx="minor">
+            <a:schemeClr val="lt1"/>
+          </a:fontRef>
+        </p:style>
+        <p:txBody>
+          <a:bodyPr rtlCol="0" anchor="ctr"/>
+          <a:lstStyle/>
+          <a:p>
+            <a:pPr algn="ctr"/>
+            <a:endParaRPr lang="ko-KR" altLang="en-US" dirty="0"/>
+          </a:p>
+        </p:txBody>
+      </p:sp>
+      <p:sp>
+        <p:nvSpPr>
+          <p:cNvPr id="16" name="설명선: 굽은 이중선 15">
+            <a:extLst>
+              <a:ext uri="{FF2B5EF4-FFF2-40B4-BE49-F238E27FC236}">
+                <a16:creationId xmlns:a16="http://schemas.microsoft.com/office/drawing/2014/main" id="{3ECF7EC8-3F0B-385B-E16D-B2F7CF19276C}"/>
+              </a:ext>
+            </a:extLst>
+          </p:cNvPr>
+          <p:cNvSpPr/>
+          <p:nvPr/>
+        </p:nvSpPr>
+        <p:spPr>
+          <a:xfrm>
+            <a:off x="5612200" y="4810612"/>
+            <a:ext cx="1501697" cy="313050"/>
+          </a:xfrm>
+          <a:prstGeom prst="borderCallout3">
+            <a:avLst>
+              <a:gd name="adj1" fmla="val 18750"/>
+              <a:gd name="adj2" fmla="val -8333"/>
+              <a:gd name="adj3" fmla="val 18750"/>
+              <a:gd name="adj4" fmla="val -16667"/>
+              <a:gd name="adj5" fmla="val 100000"/>
+              <a:gd name="adj6" fmla="val -16667"/>
+              <a:gd name="adj7" fmla="val 175276"/>
+              <a:gd name="adj8" fmla="val -3178"/>
+            </a:avLst>
+          </a:prstGeom>
+        </p:spPr>
+        <p:style>
+          <a:lnRef idx="2">
+            <a:schemeClr val="accent1"/>
+          </a:lnRef>
+          <a:fillRef idx="1">
+            <a:schemeClr val="lt1"/>
+          </a:fillRef>
+          <a:effectRef idx="0">
+            <a:schemeClr val="accent1"/>
+          </a:effectRef>
+          <a:fontRef idx="minor">
+            <a:schemeClr val="dk1"/>
+          </a:fontRef>
+        </p:style>
+        <p:txBody>
+          <a:bodyPr rtlCol="0" anchor="ctr"/>
+          <a:lstStyle/>
+          <a:p>
+            <a:pPr algn="ctr"/>
+            <a:r>
+              <a:rPr lang="en-US" altLang="ko-KR" sz="1000" dirty="0"/>
+              <a:t>CRF </a:t>
+            </a:r>
+            <a:r>
+              <a:rPr lang="ko-KR" altLang="en-US" sz="1000" dirty="0"/>
+              <a:t>폼 들여오기 섹션</a:t>
+            </a:r>
+          </a:p>
+        </p:txBody>
+      </p:sp>
+      <p:sp>
+        <p:nvSpPr>
+          <p:cNvPr id="17" name="설명선: 굽은 이중선 16">
+            <a:extLst>
+              <a:ext uri="{FF2B5EF4-FFF2-40B4-BE49-F238E27FC236}">
+                <a16:creationId xmlns:a16="http://schemas.microsoft.com/office/drawing/2014/main" id="{9CECA056-4311-4CEB-5239-9E55FB52EA17}"/>
+              </a:ext>
+            </a:extLst>
+          </p:cNvPr>
+          <p:cNvSpPr/>
+          <p:nvPr/>
+        </p:nvSpPr>
+        <p:spPr>
+          <a:xfrm>
+            <a:off x="7582862" y="4845497"/>
+            <a:ext cx="850345" cy="313050"/>
+          </a:xfrm>
+          <a:prstGeom prst="borderCallout3">
+            <a:avLst>
+              <a:gd name="adj1" fmla="val 18750"/>
+              <a:gd name="adj2" fmla="val -8333"/>
+              <a:gd name="adj3" fmla="val 18750"/>
+              <a:gd name="adj4" fmla="val -16667"/>
+              <a:gd name="adj5" fmla="val 102282"/>
+              <a:gd name="adj6" fmla="val -22548"/>
+              <a:gd name="adj7" fmla="val 157020"/>
+              <a:gd name="adj8" fmla="val -4018"/>
+            </a:avLst>
+          </a:prstGeom>
+        </p:spPr>
+        <p:style>
+          <a:lnRef idx="2">
+            <a:schemeClr val="accent1"/>
+          </a:lnRef>
+          <a:fillRef idx="1">
+            <a:schemeClr val="lt1"/>
+          </a:fillRef>
+          <a:effectRef idx="0">
+            <a:schemeClr val="accent1"/>
+          </a:effectRef>
+          <a:fontRef idx="minor">
+            <a:schemeClr val="dk1"/>
+          </a:fontRef>
+        </p:style>
+        <p:txBody>
+          <a:bodyPr rtlCol="0" anchor="ctr"/>
+          <a:lstStyle/>
+          <a:p>
+            <a:pPr algn="ctr"/>
+            <a:r>
+              <a:rPr lang="ko-KR" altLang="en-US" sz="1000"/>
+              <a:t>버튼 </a:t>
+            </a:r>
+            <a:r>
+              <a:rPr lang="ko-KR" altLang="en-US" sz="1000" dirty="0"/>
+              <a:t>섹션</a:t>
             </a:r>
           </a:p>
         </p:txBody>
@@ -5755,7 +5805,7 @@
     </p:spTree>
     <p:extLst>
       <p:ext uri="{BB962C8B-B14F-4D97-AF65-F5344CB8AC3E}">
-        <p14:creationId xmlns:p14="http://schemas.microsoft.com/office/powerpoint/2010/main" val="2654407853"/>
+        <p14:creationId xmlns:p14="http://schemas.microsoft.com/office/powerpoint/2010/main" val="2536856654"/>
       </p:ext>
     </p:extLst>
   </p:cSld>
@@ -5787,6 +5837,675 @@
           <p:cNvPr id="3" name="그림 2">
             <a:extLst>
               <a:ext uri="{FF2B5EF4-FFF2-40B4-BE49-F238E27FC236}">
+                <a16:creationId xmlns:a16="http://schemas.microsoft.com/office/drawing/2014/main" id="{F979E7C0-C5AB-4CB5-5D49-0D0707F88D54}"/>
+              </a:ext>
+            </a:extLst>
+          </p:cNvPr>
+          <p:cNvPicPr>
+            <a:picLocks noChangeAspect="1"/>
+          </p:cNvPicPr>
+          <p:nvPr/>
+        </p:nvPicPr>
+        <p:blipFill>
+          <a:blip r:embed="rId2"/>
+          <a:stretch>
+            <a:fillRect/>
+          </a:stretch>
+        </p:blipFill>
+        <p:spPr>
+          <a:xfrm>
+            <a:off x="2177791" y="1047036"/>
+            <a:ext cx="7958337" cy="5130294"/>
+          </a:xfrm>
+          <a:prstGeom prst="rect">
+            <a:avLst/>
+          </a:prstGeom>
+        </p:spPr>
+      </p:pic>
+      <p:sp>
+        <p:nvSpPr>
+          <p:cNvPr id="4" name="TextBox 3">
+            <a:extLst>
+              <a:ext uri="{FF2B5EF4-FFF2-40B4-BE49-F238E27FC236}">
+                <a16:creationId xmlns:a16="http://schemas.microsoft.com/office/drawing/2014/main" id="{38F827FE-3014-487C-2B13-EEAE438A9477}"/>
+              </a:ext>
+            </a:extLst>
+          </p:cNvPr>
+          <p:cNvSpPr txBox="1"/>
+          <p:nvPr/>
+        </p:nvSpPr>
+        <p:spPr>
+          <a:xfrm>
+            <a:off x="243840" y="170688"/>
+            <a:ext cx="1590500" cy="369332"/>
+          </a:xfrm>
+          <a:prstGeom prst="rect">
+            <a:avLst/>
+          </a:prstGeom>
+          <a:noFill/>
+        </p:spPr>
+        <p:txBody>
+          <a:bodyPr wrap="none" rtlCol="0">
+            <a:spAutoFit/>
+          </a:bodyPr>
+          <a:lstStyle/>
+          <a:p>
+            <a:r>
+              <a:rPr lang="en-US" altLang="ko-KR" dirty="0"/>
+              <a:t>[5] </a:t>
+            </a:r>
+            <a:r>
+              <a:rPr lang="ko-KR" altLang="en-US" dirty="0"/>
+              <a:t>수정 화면</a:t>
+            </a:r>
+          </a:p>
+        </p:txBody>
+      </p:sp>
+      <p:sp>
+        <p:nvSpPr>
+          <p:cNvPr id="5" name="직사각형 4">
+            <a:extLst>
+              <a:ext uri="{FF2B5EF4-FFF2-40B4-BE49-F238E27FC236}">
+                <a16:creationId xmlns:a16="http://schemas.microsoft.com/office/drawing/2014/main" id="{7A593FBD-3A2D-3971-93A8-46260989D4F4}"/>
+              </a:ext>
+            </a:extLst>
+          </p:cNvPr>
+          <p:cNvSpPr/>
+          <p:nvPr/>
+        </p:nvSpPr>
+        <p:spPr>
+          <a:xfrm>
+            <a:off x="6355748" y="1047036"/>
+            <a:ext cx="2855308" cy="374830"/>
+          </a:xfrm>
+          <a:prstGeom prst="rect">
+            <a:avLst/>
+          </a:prstGeom>
+          <a:noFill/>
+          <a:ln>
+            <a:solidFill>
+              <a:srgbClr val="FF0000"/>
+            </a:solidFill>
+          </a:ln>
+        </p:spPr>
+        <p:style>
+          <a:lnRef idx="2">
+            <a:schemeClr val="accent1">
+              <a:shade val="15000"/>
+            </a:schemeClr>
+          </a:lnRef>
+          <a:fillRef idx="1">
+            <a:schemeClr val="accent1"/>
+          </a:fillRef>
+          <a:effectRef idx="0">
+            <a:schemeClr val="accent1"/>
+          </a:effectRef>
+          <a:fontRef idx="minor">
+            <a:schemeClr val="lt1"/>
+          </a:fontRef>
+        </p:style>
+        <p:txBody>
+          <a:bodyPr rtlCol="0" anchor="ctr"/>
+          <a:lstStyle/>
+          <a:p>
+            <a:pPr algn="ctr"/>
+            <a:endParaRPr lang="ko-KR" altLang="en-US" dirty="0"/>
+          </a:p>
+        </p:txBody>
+      </p:sp>
+      <p:sp>
+        <p:nvSpPr>
+          <p:cNvPr id="6" name="직사각형 5">
+            <a:extLst>
+              <a:ext uri="{FF2B5EF4-FFF2-40B4-BE49-F238E27FC236}">
+                <a16:creationId xmlns:a16="http://schemas.microsoft.com/office/drawing/2014/main" id="{D3AFD817-94D7-AE5B-B516-5904FF3D5483}"/>
+              </a:ext>
+            </a:extLst>
+          </p:cNvPr>
+          <p:cNvSpPr/>
+          <p:nvPr/>
+        </p:nvSpPr>
+        <p:spPr>
+          <a:xfrm>
+            <a:off x="9287924" y="1047036"/>
+            <a:ext cx="726285" cy="374830"/>
+          </a:xfrm>
+          <a:prstGeom prst="rect">
+            <a:avLst/>
+          </a:prstGeom>
+          <a:noFill/>
+          <a:ln>
+            <a:solidFill>
+              <a:srgbClr val="FF0000"/>
+            </a:solidFill>
+          </a:ln>
+        </p:spPr>
+        <p:style>
+          <a:lnRef idx="2">
+            <a:schemeClr val="accent1">
+              <a:shade val="15000"/>
+            </a:schemeClr>
+          </a:lnRef>
+          <a:fillRef idx="1">
+            <a:schemeClr val="accent1"/>
+          </a:fillRef>
+          <a:effectRef idx="0">
+            <a:schemeClr val="accent1"/>
+          </a:effectRef>
+          <a:fontRef idx="minor">
+            <a:schemeClr val="lt1"/>
+          </a:fontRef>
+        </p:style>
+        <p:txBody>
+          <a:bodyPr rtlCol="0" anchor="ctr"/>
+          <a:lstStyle/>
+          <a:p>
+            <a:pPr algn="ctr"/>
+            <a:endParaRPr lang="ko-KR" altLang="en-US" dirty="0"/>
+          </a:p>
+        </p:txBody>
+      </p:sp>
+      <p:sp>
+        <p:nvSpPr>
+          <p:cNvPr id="7" name="직사각형 6">
+            <a:extLst>
+              <a:ext uri="{FF2B5EF4-FFF2-40B4-BE49-F238E27FC236}">
+                <a16:creationId xmlns:a16="http://schemas.microsoft.com/office/drawing/2014/main" id="{E3EB763A-D70B-80FE-A388-9985950DE1E5}"/>
+              </a:ext>
+            </a:extLst>
+          </p:cNvPr>
+          <p:cNvSpPr/>
+          <p:nvPr/>
+        </p:nvSpPr>
+        <p:spPr>
+          <a:xfrm>
+            <a:off x="2177791" y="1560576"/>
+            <a:ext cx="2855308" cy="236120"/>
+          </a:xfrm>
+          <a:prstGeom prst="rect">
+            <a:avLst/>
+          </a:prstGeom>
+          <a:noFill/>
+          <a:ln>
+            <a:solidFill>
+              <a:srgbClr val="FF0000"/>
+            </a:solidFill>
+          </a:ln>
+        </p:spPr>
+        <p:style>
+          <a:lnRef idx="2">
+            <a:schemeClr val="accent1">
+              <a:shade val="15000"/>
+            </a:schemeClr>
+          </a:lnRef>
+          <a:fillRef idx="1">
+            <a:schemeClr val="accent1"/>
+          </a:fillRef>
+          <a:effectRef idx="0">
+            <a:schemeClr val="accent1"/>
+          </a:effectRef>
+          <a:fontRef idx="minor">
+            <a:schemeClr val="lt1"/>
+          </a:fontRef>
+        </p:style>
+        <p:txBody>
+          <a:bodyPr rtlCol="0" anchor="ctr"/>
+          <a:lstStyle/>
+          <a:p>
+            <a:pPr algn="ctr"/>
+            <a:endParaRPr lang="ko-KR" altLang="en-US" dirty="0"/>
+          </a:p>
+        </p:txBody>
+      </p:sp>
+      <p:sp>
+        <p:nvSpPr>
+          <p:cNvPr id="8" name="직사각형 7">
+            <a:extLst>
+              <a:ext uri="{FF2B5EF4-FFF2-40B4-BE49-F238E27FC236}">
+                <a16:creationId xmlns:a16="http://schemas.microsoft.com/office/drawing/2014/main" id="{14DCA2E7-1F6C-6368-2D5A-661D1E1227DE}"/>
+              </a:ext>
+            </a:extLst>
+          </p:cNvPr>
+          <p:cNvSpPr/>
+          <p:nvPr/>
+        </p:nvSpPr>
+        <p:spPr>
+          <a:xfrm>
+            <a:off x="2177790" y="1865376"/>
+            <a:ext cx="7911089" cy="3614928"/>
+          </a:xfrm>
+          <a:prstGeom prst="rect">
+            <a:avLst/>
+          </a:prstGeom>
+          <a:noFill/>
+          <a:ln>
+            <a:solidFill>
+              <a:srgbClr val="FF0000"/>
+            </a:solidFill>
+          </a:ln>
+        </p:spPr>
+        <p:style>
+          <a:lnRef idx="2">
+            <a:schemeClr val="accent1">
+              <a:shade val="15000"/>
+            </a:schemeClr>
+          </a:lnRef>
+          <a:fillRef idx="1">
+            <a:schemeClr val="accent1"/>
+          </a:fillRef>
+          <a:effectRef idx="0">
+            <a:schemeClr val="accent1"/>
+          </a:effectRef>
+          <a:fontRef idx="minor">
+            <a:schemeClr val="lt1"/>
+          </a:fontRef>
+        </p:style>
+        <p:txBody>
+          <a:bodyPr rtlCol="0" anchor="ctr"/>
+          <a:lstStyle/>
+          <a:p>
+            <a:pPr algn="ctr"/>
+            <a:endParaRPr lang="ko-KR" altLang="en-US" dirty="0"/>
+          </a:p>
+        </p:txBody>
+      </p:sp>
+      <p:sp>
+        <p:nvSpPr>
+          <p:cNvPr id="9" name="직사각형 8">
+            <a:extLst>
+              <a:ext uri="{FF2B5EF4-FFF2-40B4-BE49-F238E27FC236}">
+                <a16:creationId xmlns:a16="http://schemas.microsoft.com/office/drawing/2014/main" id="{5E87224F-BC8C-C963-C09F-109797013313}"/>
+              </a:ext>
+            </a:extLst>
+          </p:cNvPr>
+          <p:cNvSpPr/>
+          <p:nvPr/>
+        </p:nvSpPr>
+        <p:spPr>
+          <a:xfrm>
+            <a:off x="7571232" y="5805754"/>
+            <a:ext cx="1639824" cy="320726"/>
+          </a:xfrm>
+          <a:prstGeom prst="rect">
+            <a:avLst/>
+          </a:prstGeom>
+          <a:noFill/>
+          <a:ln>
+            <a:solidFill>
+              <a:srgbClr val="FF0000"/>
+            </a:solidFill>
+          </a:ln>
+        </p:spPr>
+        <p:style>
+          <a:lnRef idx="2">
+            <a:schemeClr val="accent1">
+              <a:shade val="15000"/>
+            </a:schemeClr>
+          </a:lnRef>
+          <a:fillRef idx="1">
+            <a:schemeClr val="accent1"/>
+          </a:fillRef>
+          <a:effectRef idx="0">
+            <a:schemeClr val="accent1"/>
+          </a:effectRef>
+          <a:fontRef idx="minor">
+            <a:schemeClr val="lt1"/>
+          </a:fontRef>
+        </p:style>
+        <p:txBody>
+          <a:bodyPr rtlCol="0" anchor="ctr"/>
+          <a:lstStyle/>
+          <a:p>
+            <a:pPr algn="ctr"/>
+            <a:endParaRPr lang="ko-KR" altLang="en-US" dirty="0"/>
+          </a:p>
+        </p:txBody>
+      </p:sp>
+      <p:sp>
+        <p:nvSpPr>
+          <p:cNvPr id="10" name="직사각형 9">
+            <a:extLst>
+              <a:ext uri="{FF2B5EF4-FFF2-40B4-BE49-F238E27FC236}">
+                <a16:creationId xmlns:a16="http://schemas.microsoft.com/office/drawing/2014/main" id="{078DE206-5A9E-7770-81C6-B849F297403C}"/>
+              </a:ext>
+            </a:extLst>
+          </p:cNvPr>
+          <p:cNvSpPr/>
+          <p:nvPr/>
+        </p:nvSpPr>
+        <p:spPr>
+          <a:xfrm>
+            <a:off x="9268967" y="5805754"/>
+            <a:ext cx="819912" cy="320726"/>
+          </a:xfrm>
+          <a:prstGeom prst="rect">
+            <a:avLst/>
+          </a:prstGeom>
+          <a:noFill/>
+          <a:ln>
+            <a:solidFill>
+              <a:srgbClr val="FF0000"/>
+            </a:solidFill>
+          </a:ln>
+        </p:spPr>
+        <p:style>
+          <a:lnRef idx="2">
+            <a:schemeClr val="accent1">
+              <a:shade val="15000"/>
+            </a:schemeClr>
+          </a:lnRef>
+          <a:fillRef idx="1">
+            <a:schemeClr val="accent1"/>
+          </a:fillRef>
+          <a:effectRef idx="0">
+            <a:schemeClr val="accent1"/>
+          </a:effectRef>
+          <a:fontRef idx="minor">
+            <a:schemeClr val="lt1"/>
+          </a:fontRef>
+        </p:style>
+        <p:txBody>
+          <a:bodyPr rtlCol="0" anchor="ctr"/>
+          <a:lstStyle/>
+          <a:p>
+            <a:pPr algn="ctr"/>
+            <a:endParaRPr lang="ko-KR" altLang="en-US" dirty="0"/>
+          </a:p>
+        </p:txBody>
+      </p:sp>
+      <p:sp>
+        <p:nvSpPr>
+          <p:cNvPr id="11" name="TextBox 10">
+            <a:extLst>
+              <a:ext uri="{FF2B5EF4-FFF2-40B4-BE49-F238E27FC236}">
+                <a16:creationId xmlns:a16="http://schemas.microsoft.com/office/drawing/2014/main" id="{BEA40A6B-85A3-687C-A9CB-6ACA133E4066}"/>
+              </a:ext>
+            </a:extLst>
+          </p:cNvPr>
+          <p:cNvSpPr txBox="1"/>
+          <p:nvPr/>
+        </p:nvSpPr>
+        <p:spPr>
+          <a:xfrm>
+            <a:off x="6360286" y="1453786"/>
+            <a:ext cx="798617" cy="261610"/>
+          </a:xfrm>
+          <a:prstGeom prst="rect">
+            <a:avLst/>
+          </a:prstGeom>
+          <a:noFill/>
+        </p:spPr>
+        <p:txBody>
+          <a:bodyPr wrap="none" rtlCol="0">
+            <a:spAutoFit/>
+          </a:bodyPr>
+          <a:lstStyle/>
+          <a:p>
+            <a:r>
+              <a:rPr lang="ko-KR" altLang="en-US" sz="1100" dirty="0">
+                <a:solidFill>
+                  <a:srgbClr val="C00000"/>
+                </a:solidFill>
+              </a:rPr>
+              <a:t>버튼 섹션</a:t>
+            </a:r>
+          </a:p>
+        </p:txBody>
+      </p:sp>
+      <p:sp>
+        <p:nvSpPr>
+          <p:cNvPr id="12" name="TextBox 11">
+            <a:extLst>
+              <a:ext uri="{FF2B5EF4-FFF2-40B4-BE49-F238E27FC236}">
+                <a16:creationId xmlns:a16="http://schemas.microsoft.com/office/drawing/2014/main" id="{3D0F3B84-EB67-61B6-1995-5F9D42A96CD7}"/>
+              </a:ext>
+            </a:extLst>
+          </p:cNvPr>
+          <p:cNvSpPr txBox="1"/>
+          <p:nvPr/>
+        </p:nvSpPr>
+        <p:spPr>
+          <a:xfrm>
+            <a:off x="8914319" y="1460364"/>
+            <a:ext cx="1221809" cy="261610"/>
+          </a:xfrm>
+          <a:prstGeom prst="rect">
+            <a:avLst/>
+          </a:prstGeom>
+          <a:noFill/>
+        </p:spPr>
+        <p:txBody>
+          <a:bodyPr wrap="none" rtlCol="0">
+            <a:spAutoFit/>
+          </a:bodyPr>
+          <a:lstStyle/>
+          <a:p>
+            <a:r>
+              <a:rPr lang="ko-KR" altLang="en-US" sz="1100">
+                <a:solidFill>
+                  <a:srgbClr val="C00000"/>
+                </a:solidFill>
+              </a:rPr>
+              <a:t>리다이렉트</a:t>
+            </a:r>
+            <a:r>
+              <a:rPr lang="ko-KR" altLang="en-US" sz="1100" dirty="0">
+                <a:solidFill>
+                  <a:srgbClr val="C00000"/>
+                </a:solidFill>
+              </a:rPr>
+              <a:t> 섹션</a:t>
+            </a:r>
+          </a:p>
+        </p:txBody>
+      </p:sp>
+      <p:sp>
+        <p:nvSpPr>
+          <p:cNvPr id="13" name="TextBox 12">
+            <a:extLst>
+              <a:ext uri="{FF2B5EF4-FFF2-40B4-BE49-F238E27FC236}">
+                <a16:creationId xmlns:a16="http://schemas.microsoft.com/office/drawing/2014/main" id="{DB6E9A13-B388-2203-FA3C-B702CAFB4B62}"/>
+              </a:ext>
+            </a:extLst>
+          </p:cNvPr>
+          <p:cNvSpPr txBox="1"/>
+          <p:nvPr/>
+        </p:nvSpPr>
+        <p:spPr>
+          <a:xfrm>
+            <a:off x="3933887" y="1311384"/>
+            <a:ext cx="939681" cy="261610"/>
+          </a:xfrm>
+          <a:prstGeom prst="rect">
+            <a:avLst/>
+          </a:prstGeom>
+          <a:noFill/>
+        </p:spPr>
+        <p:txBody>
+          <a:bodyPr wrap="none" rtlCol="0">
+            <a:spAutoFit/>
+          </a:bodyPr>
+          <a:lstStyle/>
+          <a:p>
+            <a:r>
+              <a:rPr lang="ko-KR" altLang="en-US" sz="1100" dirty="0">
+                <a:solidFill>
+                  <a:srgbClr val="C00000"/>
+                </a:solidFill>
+              </a:rPr>
+              <a:t>아이디 섹션</a:t>
+            </a:r>
+          </a:p>
+        </p:txBody>
+      </p:sp>
+      <p:sp>
+        <p:nvSpPr>
+          <p:cNvPr id="14" name="TextBox 13">
+            <a:extLst>
+              <a:ext uri="{FF2B5EF4-FFF2-40B4-BE49-F238E27FC236}">
+                <a16:creationId xmlns:a16="http://schemas.microsoft.com/office/drawing/2014/main" id="{03F0865C-6EB0-ACB9-AE9D-F0EB36E12E30}"/>
+              </a:ext>
+            </a:extLst>
+          </p:cNvPr>
+          <p:cNvSpPr txBox="1"/>
+          <p:nvPr/>
+        </p:nvSpPr>
+        <p:spPr>
+          <a:xfrm>
+            <a:off x="5476175" y="3350573"/>
+            <a:ext cx="798617" cy="261610"/>
+          </a:xfrm>
+          <a:prstGeom prst="rect">
+            <a:avLst/>
+          </a:prstGeom>
+          <a:noFill/>
+        </p:spPr>
+        <p:txBody>
+          <a:bodyPr wrap="none" rtlCol="0">
+            <a:spAutoFit/>
+          </a:bodyPr>
+          <a:lstStyle/>
+          <a:p>
+            <a:r>
+              <a:rPr lang="ko-KR" altLang="en-US" sz="1100" dirty="0">
+                <a:solidFill>
+                  <a:srgbClr val="C00000"/>
+                </a:solidFill>
+              </a:rPr>
+              <a:t>입력 섹션</a:t>
+            </a:r>
+          </a:p>
+        </p:txBody>
+      </p:sp>
+      <p:sp>
+        <p:nvSpPr>
+          <p:cNvPr id="15" name="TextBox 14">
+            <a:extLst>
+              <a:ext uri="{FF2B5EF4-FFF2-40B4-BE49-F238E27FC236}">
+                <a16:creationId xmlns:a16="http://schemas.microsoft.com/office/drawing/2014/main" id="{1728FA4D-FD60-BE6A-7C32-38932D4470FD}"/>
+              </a:ext>
+            </a:extLst>
+          </p:cNvPr>
+          <p:cNvSpPr txBox="1"/>
+          <p:nvPr/>
+        </p:nvSpPr>
+        <p:spPr>
+          <a:xfrm>
+            <a:off x="7475663" y="5514226"/>
+            <a:ext cx="1568058" cy="261610"/>
+          </a:xfrm>
+          <a:prstGeom prst="rect">
+            <a:avLst/>
+          </a:prstGeom>
+          <a:noFill/>
+        </p:spPr>
+        <p:txBody>
+          <a:bodyPr wrap="none" rtlCol="0">
+            <a:spAutoFit/>
+          </a:bodyPr>
+          <a:lstStyle/>
+          <a:p>
+            <a:r>
+              <a:rPr lang="en-US" altLang="ko-KR" sz="1100" dirty="0">
+                <a:solidFill>
+                  <a:srgbClr val="C00000"/>
+                </a:solidFill>
+              </a:rPr>
+              <a:t>CRF</a:t>
+            </a:r>
+            <a:r>
+              <a:rPr lang="ko-KR" altLang="en-US" sz="1100" dirty="0">
+                <a:solidFill>
+                  <a:srgbClr val="C00000"/>
+                </a:solidFill>
+              </a:rPr>
+              <a:t> 폼 들여오기 섹션</a:t>
+            </a:r>
+          </a:p>
+        </p:txBody>
+      </p:sp>
+      <p:sp>
+        <p:nvSpPr>
+          <p:cNvPr id="16" name="TextBox 15">
+            <a:extLst>
+              <a:ext uri="{FF2B5EF4-FFF2-40B4-BE49-F238E27FC236}">
+                <a16:creationId xmlns:a16="http://schemas.microsoft.com/office/drawing/2014/main" id="{1056DEC3-8288-F44B-BDBC-635B5BA33562}"/>
+              </a:ext>
+            </a:extLst>
+          </p:cNvPr>
+          <p:cNvSpPr txBox="1"/>
+          <p:nvPr/>
+        </p:nvSpPr>
+        <p:spPr>
+          <a:xfrm>
+            <a:off x="8568070" y="6156398"/>
+            <a:ext cx="1617751" cy="261610"/>
+          </a:xfrm>
+          <a:prstGeom prst="rect">
+            <a:avLst/>
+          </a:prstGeom>
+          <a:noFill/>
+        </p:spPr>
+        <p:txBody>
+          <a:bodyPr wrap="none" rtlCol="0">
+            <a:spAutoFit/>
+          </a:bodyPr>
+          <a:lstStyle/>
+          <a:p>
+            <a:r>
+              <a:rPr lang="en-US" altLang="ko-KR" sz="1100" dirty="0">
+                <a:solidFill>
+                  <a:srgbClr val="C00000"/>
+                </a:solidFill>
+              </a:rPr>
+              <a:t>CRF</a:t>
+            </a:r>
+            <a:r>
+              <a:rPr lang="ko-KR" altLang="en-US" sz="1100" dirty="0">
+                <a:solidFill>
+                  <a:srgbClr val="C00000"/>
+                </a:solidFill>
+              </a:rPr>
+              <a:t> 폼 생성 버튼 섹션</a:t>
+            </a:r>
+          </a:p>
+        </p:txBody>
+      </p:sp>
+    </p:spTree>
+    <p:extLst>
+      <p:ext uri="{BB962C8B-B14F-4D97-AF65-F5344CB8AC3E}">
+        <p14:creationId xmlns:p14="http://schemas.microsoft.com/office/powerpoint/2010/main" val="2654407853"/>
+      </p:ext>
+    </p:extLst>
+  </p:cSld>
+  <p:clrMapOvr>
+    <a:masterClrMapping/>
+  </p:clrMapOvr>
+</p:sld>
+</file>
+
+<file path=ppt/slides/slide5.xml><?xml version="1.0" encoding="utf-8"?>
+<p:sld xmlns:a="http://schemas.openxmlformats.org/drawingml/2006/main" xmlns:r="http://schemas.openxmlformats.org/officeDocument/2006/relationships" xmlns:p="http://schemas.openxmlformats.org/presentationml/2006/main">
+  <p:cSld>
+    <p:spTree>
+      <p:nvGrpSpPr>
+        <p:cNvPr id="1" name=""/>
+        <p:cNvGrpSpPr/>
+        <p:nvPr/>
+      </p:nvGrpSpPr>
+      <p:grpSpPr>
+        <a:xfrm>
+          <a:off x="0" y="0"/>
+          <a:ext cx="0" cy="0"/>
+          <a:chOff x="0" y="0"/>
+          <a:chExt cx="0" cy="0"/>
+        </a:xfrm>
+      </p:grpSpPr>
+      <p:pic>
+        <p:nvPicPr>
+          <p:cNvPr id="3" name="그림 2">
+            <a:extLst>
+              <a:ext uri="{FF2B5EF4-FFF2-40B4-BE49-F238E27FC236}">
                 <a16:creationId xmlns:a16="http://schemas.microsoft.com/office/drawing/2014/main" id="{5CF41791-A716-39CE-1076-59E01A779718}"/>
               </a:ext>
             </a:extLst>
@@ -5825,7 +6544,7 @@
 </p:sld>
 </file>
 
-<file path=ppt/slides/slide5.xml><?xml version="1.0" encoding="utf-8"?>
+<file path=ppt/slides/slide6.xml><?xml version="1.0" encoding="utf-8"?>
 <p:sld xmlns:a="http://schemas.openxmlformats.org/drawingml/2006/main" xmlns:r="http://schemas.openxmlformats.org/officeDocument/2006/relationships" xmlns:p="http://schemas.openxmlformats.org/presentationml/2006/main">
   <p:cSld>
     <p:spTree>

</xml_diff>